<commit_message>
Password &b email  validations and testing validations completed. Password double encryption error is fixed. removed encoding for SetPasswordHash in User class and now the login test passed.
</commit_message>
<xml_diff>
--- a/presentation Design and Implementation of an Investment Portfolio Asset(CBF).pptx
+++ b/presentation Design and Implementation of an Investment Portfolio Asset(CBF).pptx
@@ -5,7 +5,7 @@
     <p:sldMasterId id="2147483660" r:id="rId1"/>
   </p:sldMasterIdLst>
   <p:notesMasterIdLst>
-    <p:notesMasterId r:id="rId22"/>
+    <p:notesMasterId r:id="rId23"/>
   </p:notesMasterIdLst>
   <p:sldIdLst>
     <p:sldId id="2561" r:id="rId2"/>
@@ -18,16 +18,17 @@
     <p:sldId id="2568" r:id="rId9"/>
     <p:sldId id="2569" r:id="rId10"/>
     <p:sldId id="2570" r:id="rId11"/>
-    <p:sldId id="2571" r:id="rId12"/>
-    <p:sldId id="2572" r:id="rId13"/>
-    <p:sldId id="2573" r:id="rId14"/>
-    <p:sldId id="2574" r:id="rId15"/>
-    <p:sldId id="2575" r:id="rId16"/>
-    <p:sldId id="2576" r:id="rId17"/>
-    <p:sldId id="2577" r:id="rId18"/>
-    <p:sldId id="2578" r:id="rId19"/>
-    <p:sldId id="2580" r:id="rId20"/>
-    <p:sldId id="2579" r:id="rId21"/>
+    <p:sldId id="2581" r:id="rId12"/>
+    <p:sldId id="2571" r:id="rId13"/>
+    <p:sldId id="2572" r:id="rId14"/>
+    <p:sldId id="2573" r:id="rId15"/>
+    <p:sldId id="2574" r:id="rId16"/>
+    <p:sldId id="2575" r:id="rId17"/>
+    <p:sldId id="2576" r:id="rId18"/>
+    <p:sldId id="2577" r:id="rId19"/>
+    <p:sldId id="2578" r:id="rId20"/>
+    <p:sldId id="2580" r:id="rId21"/>
+    <p:sldId id="2579" r:id="rId22"/>
   </p:sldIdLst>
   <p:sldSz cx="12192000" cy="6858000"/>
   <p:notesSz cx="6858000" cy="9144000"/>
@@ -149,6 +150,7 @@
             <p14:sldId id="2568"/>
             <p14:sldId id="2569"/>
             <p14:sldId id="2570"/>
+            <p14:sldId id="2581"/>
           </p14:sldIdLst>
         </p14:section>
         <p14:section name="Core Features and Functionality" id="{36EA6547-356F-4D61-A845-DF750CD4E51C}">
@@ -174,6 +176,9 @@
           </p14:sldIdLst>
         </p14:section>
       </p14:sectionLst>
+    </p:ext>
+    <p:ext uri="{EFAFB233-063F-42B5-8137-9DF3F51BA10A}">
+      <p15:sldGuideLst xmlns:p15="http://schemas.microsoft.com/office/powerpoint/2012/main"/>
     </p:ext>
   </p:extLst>
 </p:presentation>
@@ -3034,7 +3039,7 @@
           <a:p>
             <a:fld id="{6EB3EBC5-D3E2-4EE5-97AD-619E36ACE3E4}" type="datetimeFigureOut">
               <a:rPr lang="en-GB" smtClean="0"/>
-              <a:t>20/08/2025</a:t>
+              <a:t>21/08/2025</a:t>
             </a:fld>
             <a:endParaRPr lang="en-GB"/>
           </a:p>
@@ -3551,7 +3556,7 @@
           <a:p>
             <a:fld id="{68B69070-6ACF-4E6A-9D68-CD733EA441EB}" type="slidenum">
               <a:rPr lang="en-GB" smtClean="0"/>
-              <a:t>11</a:t>
+              <a:t>12</a:t>
             </a:fld>
             <a:endParaRPr lang="en-GB"/>
           </a:p>
@@ -3642,7 +3647,7 @@
           <a:p>
             <a:fld id="{68B69070-6ACF-4E6A-9D68-CD733EA441EB}" type="slidenum">
               <a:rPr lang="en-GB" smtClean="0"/>
-              <a:t>12</a:t>
+              <a:t>13</a:t>
             </a:fld>
             <a:endParaRPr lang="en-GB"/>
           </a:p>
@@ -3733,7 +3738,7 @@
           <a:p>
             <a:fld id="{68B69070-6ACF-4E6A-9D68-CD733EA441EB}" type="slidenum">
               <a:rPr lang="en-GB" smtClean="0"/>
-              <a:t>13</a:t>
+              <a:t>14</a:t>
             </a:fld>
             <a:endParaRPr lang="en-GB"/>
           </a:p>
@@ -3824,7 +3829,7 @@
           <a:p>
             <a:fld id="{68B69070-6ACF-4E6A-9D68-CD733EA441EB}" type="slidenum">
               <a:rPr lang="en-GB" smtClean="0"/>
-              <a:t>14</a:t>
+              <a:t>15</a:t>
             </a:fld>
             <a:endParaRPr lang="en-GB"/>
           </a:p>
@@ -3911,7 +3916,7 @@
           <a:p>
             <a:fld id="{68B69070-6ACF-4E6A-9D68-CD733EA441EB}" type="slidenum">
               <a:rPr lang="en-GB" smtClean="0"/>
-              <a:t>15</a:t>
+              <a:t>16</a:t>
             </a:fld>
             <a:endParaRPr lang="en-GB"/>
           </a:p>
@@ -4002,7 +4007,7 @@
           <a:p>
             <a:fld id="{68B69070-6ACF-4E6A-9D68-CD733EA441EB}" type="slidenum">
               <a:rPr lang="en-GB" smtClean="0"/>
-              <a:t>16</a:t>
+              <a:t>17</a:t>
             </a:fld>
             <a:endParaRPr lang="en-GB"/>
           </a:p>
@@ -4093,7 +4098,7 @@
           <a:p>
             <a:fld id="{68B69070-6ACF-4E6A-9D68-CD733EA441EB}" type="slidenum">
               <a:rPr lang="en-GB" smtClean="0"/>
-              <a:t>17</a:t>
+              <a:t>18</a:t>
             </a:fld>
             <a:endParaRPr lang="en-GB"/>
           </a:p>
@@ -4184,7 +4189,7 @@
           <a:p>
             <a:fld id="{68B69070-6ACF-4E6A-9D68-CD733EA441EB}" type="slidenum">
               <a:rPr lang="en-GB" smtClean="0"/>
-              <a:t>18</a:t>
+              <a:t>19</a:t>
             </a:fld>
             <a:endParaRPr lang="en-GB"/>
           </a:p>
@@ -4271,7 +4276,7 @@
           <a:p>
             <a:fld id="{68B69070-6ACF-4E6A-9D68-CD733EA441EB}" type="slidenum">
               <a:rPr lang="en-GB" smtClean="0"/>
-              <a:t>20</a:t>
+              <a:t>21</a:t>
             </a:fld>
             <a:endParaRPr lang="en-GB"/>
           </a:p>
@@ -5166,7 +5171,7 @@
           <a:p>
             <a:fld id="{6444479B-705B-4489-957E-7E8A228BDFA0}" type="datetime1">
               <a:rPr lang="en-US" smtClean="0"/>
-              <a:t>8/20/2025</a:t>
+              <a:t>8/21/2025</a:t>
             </a:fld>
             <a:endParaRPr lang="en-US"/>
           </a:p>
@@ -5366,7 +5371,7 @@
           <a:p>
             <a:fld id="{C07B66AD-7C08-490A-ADA4-B47E10FB2407}" type="datetime1">
               <a:rPr lang="en-US" smtClean="0"/>
-              <a:t>8/20/2025</a:t>
+              <a:t>8/21/2025</a:t>
             </a:fld>
             <a:endParaRPr lang="en-US"/>
           </a:p>
@@ -5625,7 +5630,7 @@
           <a:p>
             <a:fld id="{05B95027-4255-49E7-9841-CD21BCC99996}" type="datetime1">
               <a:rPr lang="en-US" smtClean="0"/>
-              <a:t>8/20/2025</a:t>
+              <a:t>8/21/2025</a:t>
             </a:fld>
             <a:endParaRPr lang="en-US"/>
           </a:p>
@@ -5866,7 +5871,7 @@
           <a:p>
             <a:fld id="{9F89F774-3FA6-43B8-9241-99959C8FD463}" type="datetime1">
               <a:rPr lang="en-US" smtClean="0"/>
-              <a:t>8/20/2025</a:t>
+              <a:t>8/21/2025</a:t>
             </a:fld>
             <a:endParaRPr lang="en-US"/>
           </a:p>
@@ -6193,7 +6198,7 @@
           <a:p>
             <a:fld id="{F9504452-5DCC-4FE2-A5C9-8A5EF6714D65}" type="datetime1">
               <a:rPr lang="en-US" smtClean="0"/>
-              <a:t>8/20/2025</a:t>
+              <a:t>8/21/2025</a:t>
             </a:fld>
             <a:endParaRPr lang="en-US"/>
           </a:p>
@@ -6503,7 +6508,7 @@
           <a:p>
             <a:fld id="{E579ABC2-0180-4F3A-A895-A85BC724D472}" type="datetime1">
               <a:rPr lang="en-US" smtClean="0"/>
-              <a:t>8/20/2025</a:t>
+              <a:t>8/21/2025</a:t>
             </a:fld>
             <a:endParaRPr lang="en-US"/>
           </a:p>
@@ -6921,7 +6926,7 @@
           <a:p>
             <a:fld id="{6AEEA9BA-4E8F-439E-BEA4-91FBA01E3F5F}" type="datetime1">
               <a:rPr lang="en-US" smtClean="0"/>
-              <a:t>8/20/2025</a:t>
+              <a:t>8/21/2025</a:t>
             </a:fld>
             <a:endParaRPr lang="en-US"/>
           </a:p>
@@ -7063,7 +7068,7 @@
           <a:p>
             <a:fld id="{BE15BF18-0007-481C-AA29-413124BC3EE7}" type="datetime1">
               <a:rPr lang="en-US" smtClean="0"/>
-              <a:t>8/20/2025</a:t>
+              <a:t>8/21/2025</a:t>
             </a:fld>
             <a:endParaRPr lang="en-US"/>
           </a:p>
@@ -7225,7 +7230,7 @@
           <a:p>
             <a:fld id="{09BE9870-3748-43AD-B547-02A075CB4A1D}" type="datetime1">
               <a:rPr lang="en-US" smtClean="0"/>
-              <a:t>8/20/2025</a:t>
+              <a:t>8/21/2025</a:t>
             </a:fld>
             <a:endParaRPr lang="en-US"/>
           </a:p>
@@ -7542,7 +7547,7 @@
           <a:p>
             <a:fld id="{558E7897-33C5-4F1A-9307-D068E37F3DC7}" type="datetime1">
               <a:rPr lang="en-US" smtClean="0"/>
-              <a:t>8/20/2025</a:t>
+              <a:t>8/21/2025</a:t>
             </a:fld>
             <a:endParaRPr lang="en-US"/>
           </a:p>
@@ -7837,7 +7842,7 @@
           <a:p>
             <a:fld id="{82E171BA-CC09-47C8-A6DF-F5C5CB59CEEC}" type="datetime1">
               <a:rPr lang="en-US" smtClean="0"/>
-              <a:t>8/20/2025</a:t>
+              <a:t>8/21/2025</a:t>
             </a:fld>
             <a:endParaRPr lang="en-US"/>
           </a:p>
@@ -8078,7 +8083,7 @@
           <a:p>
             <a:fld id="{7DA38F49-B3E2-4BF0-BEC7-C30D34ABBB8D}" type="datetime1">
               <a:rPr lang="en-US" smtClean="0"/>
-              <a:t>8/20/2025</a:t>
+              <a:t>8/21/2025</a:t>
             </a:fld>
             <a:endParaRPr lang="en-US"/>
           </a:p>
@@ -9449,6 +9454,195 @@
 <file path=ppt/slides/slide11.xml><?xml version="1.0" encoding="utf-8"?>
 <p:sld xmlns:a="http://schemas.openxmlformats.org/drawingml/2006/main" xmlns:r="http://schemas.openxmlformats.org/officeDocument/2006/relationships" xmlns:p="http://schemas.openxmlformats.org/presentationml/2006/main">
   <p:cSld>
+    <p:spTree>
+      <p:nvGrpSpPr>
+        <p:cNvPr id="1" name=""/>
+        <p:cNvGrpSpPr/>
+        <p:nvPr/>
+      </p:nvGrpSpPr>
+      <p:grpSpPr>
+        <a:xfrm>
+          <a:off x="0" y="0"/>
+          <a:ext cx="0" cy="0"/>
+          <a:chOff x="0" y="0"/>
+          <a:chExt cx="0" cy="0"/>
+        </a:xfrm>
+      </p:grpSpPr>
+      <p:sp>
+        <p:nvSpPr>
+          <p:cNvPr id="3" name="Content Placeholder 2">
+            <a:extLst>
+              <a:ext uri="{FF2B5EF4-FFF2-40B4-BE49-F238E27FC236}">
+                <a16:creationId xmlns:a16="http://schemas.microsoft.com/office/drawing/2014/main" id="{7E5B8B23-FE1A-E28A-C69A-CEC171A70182}"/>
+              </a:ext>
+            </a:extLst>
+          </p:cNvPr>
+          <p:cNvSpPr>
+            <a:spLocks noGrp="1"/>
+          </p:cNvSpPr>
+          <p:nvPr>
+            <p:ph sz="half" idx="1"/>
+          </p:nvPr>
+        </p:nvSpPr>
+        <p:spPr>
+          <a:xfrm>
+            <a:off x="563880" y="314814"/>
+            <a:ext cx="10550434" cy="5487271"/>
+          </a:xfrm>
+        </p:spPr>
+        <p:txBody>
+          <a:bodyPr>
+            <a:noAutofit/>
+          </a:bodyPr>
+          <a:lstStyle/>
+          <a:p>
+            <a:r>
+              <a:rPr lang="en-US" sz="1600" dirty="0"/>
+              <a:t>^ ensures that the pattern checks from the start of the password string.</a:t>
+            </a:r>
+          </a:p>
+          <a:p>
+            <a:r>
+              <a:rPr lang="en-US" sz="1600"/>
+              <a:t>(?=...) </a:t>
+            </a:r>
+            <a:r>
+              <a:rPr lang="en-US" sz="1600" dirty="0"/>
+              <a:t>— Positive Lookahead</a:t>
+            </a:r>
+          </a:p>
+          <a:p>
+            <a:r>
+              <a:rPr lang="en-US" sz="1600" dirty="0"/>
+              <a:t>This is a "lookahead" assertion in regex.</a:t>
+            </a:r>
+          </a:p>
+          <a:p>
+            <a:r>
+              <a:rPr lang="en-US" sz="1600" dirty="0"/>
+              <a:t>It means: "the following pattern must be found ahead in the string, but don't consume any characters."</a:t>
+            </a:r>
+          </a:p>
+          <a:p>
+            <a:r>
+              <a:rPr lang="en-US" sz="1600" dirty="0"/>
+              <a:t>Example: (?=.*[A-Z]) means "there must be at least one uppercase letter somewhere ahead in the string."</a:t>
+            </a:r>
+          </a:p>
+          <a:p>
+            <a:r>
+              <a:rPr lang="en-US" sz="1600" dirty="0"/>
+              <a:t>.*? — Non-Greedy Match</a:t>
+            </a:r>
+          </a:p>
+          <a:p>
+            <a:r>
+              <a:rPr lang="en-US" sz="1600" dirty="0"/>
+              <a:t>. means "any character except newline."</a:t>
+            </a:r>
+          </a:p>
+          <a:p>
+            <a:r>
+              <a:rPr lang="en-US" sz="1600" dirty="0"/>
+              <a:t>* means "zero or more times."</a:t>
+            </a:r>
+          </a:p>
+          <a:p>
+            <a:r>
+              <a:rPr lang="en-US" sz="1600" dirty="0"/>
+              <a:t>*? is the "non-greedy" (or "lazy") version, meaning it matches as few characters as possible.</a:t>
+            </a:r>
+          </a:p>
+          <a:p>
+            <a:r>
+              <a:rPr lang="en-US" sz="1600" dirty="0"/>
+              <a:t>In this context, .*? is used inside the lookahead to allow any characters before the required character, but to stop as soon as the required character is found.</a:t>
+            </a:r>
+          </a:p>
+          <a:p>
+            <a:r>
+              <a:rPr lang="en-US" sz="1600" dirty="0"/>
+              <a:t>Together: (?=.*?[A-Z])</a:t>
+            </a:r>
+          </a:p>
+          <a:p>
+            <a:r>
+              <a:rPr lang="en-US" sz="1600" dirty="0"/>
+              <a:t>(?= ... ) is the lookahead.</a:t>
+            </a:r>
+          </a:p>
+          <a:p>
+            <a:r>
+              <a:rPr lang="en-US" sz="1600" dirty="0"/>
+              <a:t>.*? matches any number of characters (as few as possible).</a:t>
+            </a:r>
+          </a:p>
+          <a:p>
+            <a:r>
+              <a:rPr lang="en-US" sz="1600" dirty="0"/>
+              <a:t>[A-Z] is the required character (an uppercase letter).</a:t>
+            </a:r>
+          </a:p>
+          <a:p>
+            <a:r>
+              <a:rPr lang="en-US" sz="1600" dirty="0"/>
+              <a:t>So, (?=.*?[A-Z]) means: "At least one uppercase letter must appear somewhere in the string.“</a:t>
+            </a:r>
+          </a:p>
+          <a:p>
+            <a:endParaRPr lang="en-US" sz="1600" dirty="0"/>
+          </a:p>
+          <a:p>
+            <a:r>
+              <a:rPr lang="en-US" sz="1600" dirty="0"/>
+              <a:t>Summary Table:</a:t>
+            </a:r>
+          </a:p>
+          <a:p>
+            <a:r>
+              <a:rPr lang="en-US" sz="1600" dirty="0"/>
+              <a:t>Part	Meaning</a:t>
+            </a:r>
+          </a:p>
+          <a:p>
+            <a:r>
+              <a:rPr lang="en-US" sz="1600" dirty="0"/>
+              <a:t>(?=...)	Lookahead: require this pattern ahead, but don't consume characters</a:t>
+            </a:r>
+          </a:p>
+          <a:p>
+            <a:r>
+              <a:rPr lang="en-US" sz="1600" dirty="0"/>
+              <a:t>.*?	Any characters, as few as possible (non-greedy)</a:t>
+            </a:r>
+          </a:p>
+          <a:p>
+            <a:r>
+              <a:rPr lang="en-US" sz="1600" dirty="0"/>
+              <a:t>[A-Z]	The required character (e.g., uppercase letter)</a:t>
+            </a:r>
+          </a:p>
+          <a:p>
+            <a:endParaRPr lang="en-GB" sz="1600" dirty="0"/>
+          </a:p>
+        </p:txBody>
+      </p:sp>
+    </p:spTree>
+    <p:extLst>
+      <p:ext uri="{BB962C8B-B14F-4D97-AF65-F5344CB8AC3E}">
+        <p14:creationId xmlns:p14="http://schemas.microsoft.com/office/powerpoint/2010/main" val="2760518266"/>
+      </p:ext>
+    </p:extLst>
+  </p:cSld>
+  <p:clrMapOvr>
+    <a:masterClrMapping/>
+  </p:clrMapOvr>
+</p:sld>
+</file>
+
+<file path=ppt/slides/slide12.xml><?xml version="1.0" encoding="utf-8"?>
+<p:sld xmlns:a="http://schemas.openxmlformats.org/drawingml/2006/main" xmlns:r="http://schemas.openxmlformats.org/officeDocument/2006/relationships" xmlns:p="http://schemas.openxmlformats.org/presentationml/2006/main">
+  <p:cSld>
     <p:bg>
       <p:bgPr>
         <a:solidFill>
@@ -9859,7 +10053,7 @@
 </p:sld>
 </file>
 
-<file path=ppt/slides/slide12.xml><?xml version="1.0" encoding="utf-8"?>
+<file path=ppt/slides/slide13.xml><?xml version="1.0" encoding="utf-8"?>
 <p:sld xmlns:a="http://schemas.openxmlformats.org/drawingml/2006/main" xmlns:r="http://schemas.openxmlformats.org/officeDocument/2006/relationships" xmlns:p="http://schemas.openxmlformats.org/presentationml/2006/main">
   <p:cSld>
     <p:bg>
@@ -10241,469 +10435,6 @@
     <p:extLst>
       <p:ext uri="{BB962C8B-B14F-4D97-AF65-F5344CB8AC3E}">
         <p14:creationId xmlns:p14="http://schemas.microsoft.com/office/powerpoint/2010/main" val="3393187445"/>
-      </p:ext>
-    </p:extLst>
-  </p:cSld>
-  <p:clrMapOvr>
-    <a:masterClrMapping/>
-  </p:clrMapOvr>
-  <p:transition>
-    <p:fade/>
-  </p:transition>
-  <p:timing>
-    <p:tnLst>
-      <p:par>
-        <p:cTn id="1" dur="indefinite" restart="never" nodeType="tmRoot">
-          <p:childTnLst>
-            <p:seq concurrent="1" nextAc="seek">
-              <p:cTn id="2" dur="indefinite" nodeType="mainSeq">
-                <p:childTnLst>
-                  <p:par>
-                    <p:cTn id="3" fill="hold">
-                      <p:stCondLst>
-                        <p:cond delay="indefinite"/>
-                        <p:cond evt="onBegin" delay="0">
-                          <p:tn val="2"/>
-                        </p:cond>
-                      </p:stCondLst>
-                      <p:childTnLst>
-                        <p:par>
-                          <p:cTn id="4" fill="hold">
-                            <p:stCondLst>
-                              <p:cond delay="0"/>
-                            </p:stCondLst>
-                            <p:childTnLst>
-                              <p:par>
-                                <p:cTn id="5" presetID="10" presetClass="entr" presetSubtype="0" fill="hold" grpId="0" nodeType="withEffect">
-                                  <p:stCondLst>
-                                    <p:cond delay="250"/>
-                                  </p:stCondLst>
-                                  <p:iterate>
-                                    <p:tmPct val="10000"/>
-                                  </p:iterate>
-                                  <p:childTnLst>
-                                    <p:set>
-                                      <p:cBhvr>
-                                        <p:cTn id="6" dur="1" fill="hold">
-                                          <p:stCondLst>
-                                            <p:cond delay="0"/>
-                                          </p:stCondLst>
-                                        </p:cTn>
-                                        <p:tgtEl>
-                                          <p:spTgt spid="4"/>
-                                        </p:tgtEl>
-                                        <p:attrNameLst>
-                                          <p:attrName>style.visibility</p:attrName>
-                                        </p:attrNameLst>
-                                      </p:cBhvr>
-                                      <p:to>
-                                        <p:strVal val="visible"/>
-                                      </p:to>
-                                    </p:set>
-                                    <p:animEffect transition="in" filter="fade">
-                                      <p:cBhvr>
-                                        <p:cTn id="7" dur="500"/>
-                                        <p:tgtEl>
-                                          <p:spTgt spid="4"/>
-                                        </p:tgtEl>
-                                      </p:cBhvr>
-                                    </p:animEffect>
-                                  </p:childTnLst>
-                                </p:cTn>
-                              </p:par>
-                            </p:childTnLst>
-                          </p:cTn>
-                        </p:par>
-                      </p:childTnLst>
-                    </p:cTn>
-                  </p:par>
-                </p:childTnLst>
-              </p:cTn>
-              <p:prevCondLst>
-                <p:cond evt="onPrev" delay="0">
-                  <p:tgtEl>
-                    <p:sldTgt/>
-                  </p:tgtEl>
-                </p:cond>
-              </p:prevCondLst>
-              <p:nextCondLst>
-                <p:cond evt="onNext" delay="0">
-                  <p:tgtEl>
-                    <p:sldTgt/>
-                  </p:tgtEl>
-                </p:cond>
-              </p:nextCondLst>
-            </p:seq>
-          </p:childTnLst>
-        </p:cTn>
-      </p:par>
-    </p:tnLst>
-    <p:bldLst>
-      <p:bldP spid="4" grpId="0"/>
-    </p:bldLst>
-  </p:timing>
-</p:sld>
-</file>
-
-<file path=ppt/slides/slide13.xml><?xml version="1.0" encoding="utf-8"?>
-<p:sld xmlns:a="http://schemas.openxmlformats.org/drawingml/2006/main" xmlns:r="http://schemas.openxmlformats.org/officeDocument/2006/relationships" xmlns:p="http://schemas.openxmlformats.org/presentationml/2006/main">
-  <p:cSld>
-    <p:bg>
-      <p:bgPr>
-        <a:solidFill>
-          <a:schemeClr val="bg1"/>
-        </a:solidFill>
-        <a:effectLst/>
-      </p:bgPr>
-    </p:bg>
-    <p:spTree>
-      <p:nvGrpSpPr>
-        <p:cNvPr id="1" name=""/>
-        <p:cNvGrpSpPr/>
-        <p:nvPr/>
-      </p:nvGrpSpPr>
-      <p:grpSpPr>
-        <a:xfrm>
-          <a:off x="0" y="0"/>
-          <a:ext cx="0" cy="0"/>
-          <a:chOff x="0" y="0"/>
-          <a:chExt cx="0" cy="0"/>
-        </a:xfrm>
-      </p:grpSpPr>
-      <p:cxnSp>
-        <p:nvCxnSpPr>
-          <p:cNvPr id="10" name="Straight Connector 9">
-            <a:extLst>
-              <a:ext uri="{FF2B5EF4-FFF2-40B4-BE49-F238E27FC236}">
-                <a16:creationId xmlns:a16="http://schemas.microsoft.com/office/drawing/2014/main" id="{118E06E4-607B-144B-382B-AD3D06B1EE8C}"/>
-              </a:ext>
-              <a:ext uri="{C183D7F6-B498-43B3-948B-1728B52AA6E4}">
-                <adec:decorative xmlns:adec="http://schemas.microsoft.com/office/drawing/2017/decorative" val="1"/>
-              </a:ext>
-            </a:extLst>
-          </p:cNvPr>
-          <p:cNvCxnSpPr>
-            <a:cxnSpLocks noGrp="1" noRot="1" noChangeAspect="1" noMove="1" noResize="1" noEditPoints="1" noAdjustHandles="1" noChangeArrowheads="1" noChangeShapeType="1"/>
-          </p:cNvCxnSpPr>
-          <p:nvPr>
-            <p:extLst>
-              <p:ext uri="{386F3935-93C4-4BCD-93E2-E3B085C9AB24}">
-                <p16:designElem xmlns:p16="http://schemas.microsoft.com/office/powerpoint/2015/main" val="1"/>
-              </p:ext>
-            </p:extLst>
-          </p:nvPr>
-        </p:nvCxnSpPr>
-        <p:spPr>
-          <a:xfrm>
-            <a:off x="713232" y="1031001"/>
-            <a:ext cx="978862" cy="0"/>
-          </a:xfrm>
-          <a:prstGeom prst="line">
-            <a:avLst/>
-          </a:prstGeom>
-          <a:ln w="76200"/>
-        </p:spPr>
-        <p:style>
-          <a:lnRef idx="1">
-            <a:schemeClr val="accent1"/>
-          </a:lnRef>
-          <a:fillRef idx="0">
-            <a:schemeClr val="accent1"/>
-          </a:fillRef>
-          <a:effectRef idx="0">
-            <a:schemeClr val="accent1"/>
-          </a:effectRef>
-          <a:fontRef idx="minor">
-            <a:schemeClr val="tx1"/>
-          </a:fontRef>
-        </p:style>
-      </p:cxnSp>
-      <p:sp useBgFill="1">
-        <p:nvSpPr>
-          <p:cNvPr id="12" name="Rectangle 11">
-            <a:extLst>
-              <a:ext uri="{FF2B5EF4-FFF2-40B4-BE49-F238E27FC236}">
-                <a16:creationId xmlns:a16="http://schemas.microsoft.com/office/drawing/2014/main" id="{744CAA32-F237-419C-A2DD-43C28D920D3C}"/>
-              </a:ext>
-              <a:ext uri="{C183D7F6-B498-43B3-948B-1728B52AA6E4}">
-                <adec:decorative xmlns:adec="http://schemas.microsoft.com/office/drawing/2017/decorative" val="1"/>
-              </a:ext>
-            </a:extLst>
-          </p:cNvPr>
-          <p:cNvSpPr>
-            <a:spLocks noGrp="1" noRot="1" noChangeAspect="1" noMove="1" noResize="1" noEditPoints="1" noAdjustHandles="1" noChangeArrowheads="1" noChangeShapeType="1" noTextEdit="1"/>
-          </p:cNvSpPr>
-          <p:nvPr>
-            <p:extLst>
-              <p:ext uri="{386F3935-93C4-4BCD-93E2-E3B085C9AB24}">
-                <p16:designElem xmlns:p16="http://schemas.microsoft.com/office/powerpoint/2015/main" val="1"/>
-              </p:ext>
-            </p:extLst>
-          </p:nvPr>
-        </p:nvSpPr>
-        <p:spPr>
-          <a:xfrm>
-            <a:off x="0" y="0"/>
-            <a:ext cx="12192000" cy="6858000"/>
-          </a:xfrm>
-          <a:prstGeom prst="rect">
-            <a:avLst/>
-          </a:prstGeom>
-          <a:ln w="12700" cap="flat" cmpd="sng" algn="ctr">
-            <a:noFill/>
-            <a:prstDash val="solid"/>
-            <a:miter lim="800000"/>
-          </a:ln>
-          <a:effectLst/>
-          <a:extLst>
-            <a:ext uri="{91240B29-F687-4F45-9708-019B960494DF}">
-              <a14:hiddenLine xmlns:a14="http://schemas.microsoft.com/office/drawing/2010/main" w="12700" cap="flat" cmpd="sng" algn="ctr">
-                <a:solidFill>
-                  <a:schemeClr val="accent1">
-                    <a:shade val="50000"/>
-                  </a:schemeClr>
-                </a:solidFill>
-                <a:prstDash val="solid"/>
-                <a:miter lim="800000"/>
-              </a14:hiddenLine>
-            </a:ext>
-          </a:extLst>
-        </p:spPr>
-        <p:style>
-          <a:lnRef idx="2">
-            <a:schemeClr val="accent1">
-              <a:shade val="50000"/>
-            </a:schemeClr>
-          </a:lnRef>
-          <a:fillRef idx="1">
-            <a:schemeClr val="accent1"/>
-          </a:fillRef>
-          <a:effectRef idx="0">
-            <a:schemeClr val="accent1"/>
-          </a:effectRef>
-          <a:fontRef idx="minor">
-            <a:schemeClr val="lt1"/>
-          </a:fontRef>
-        </p:style>
-        <p:txBody>
-          <a:bodyPr rtlCol="0" anchor="ctr"/>
-          <a:lstStyle/>
-          <a:p>
-            <a:pPr algn="ctr"/>
-            <a:endParaRPr lang="en-US"/>
-          </a:p>
-        </p:txBody>
-      </p:sp>
-      <p:sp>
-        <p:nvSpPr>
-          <p:cNvPr id="2" name="Title 1">
-            <a:extLst>
-              <a:ext uri="{FF2B5EF4-FFF2-40B4-BE49-F238E27FC236}">
-                <a16:creationId xmlns:a16="http://schemas.microsoft.com/office/drawing/2014/main" id="{D898CCB8-999A-72EA-5CF0-A5178E03149F}"/>
-              </a:ext>
-            </a:extLst>
-          </p:cNvPr>
-          <p:cNvSpPr>
-            <a:spLocks noGrp="1"/>
-          </p:cNvSpPr>
-          <p:nvPr>
-            <p:ph type="title"/>
-          </p:nvPr>
-        </p:nvSpPr>
-        <p:spPr>
-          <a:xfrm>
-            <a:off x="7269904" y="914400"/>
-            <a:ext cx="4261104" cy="1097280"/>
-          </a:xfrm>
-        </p:spPr>
-        <p:txBody>
-          <a:bodyPr vert="horz" lIns="91440" tIns="45720" rIns="91440" bIns="45720" rtlCol="0" anchor="t">
-            <a:normAutofit/>
-          </a:bodyPr>
-          <a:lstStyle/>
-          <a:p>
-            <a:pPr>
-              <a:lnSpc>
-                <a:spcPct val="90000"/>
-              </a:lnSpc>
-            </a:pPr>
-            <a:r>
-              <a:rPr lang="en-US" sz="3100"/>
-              <a:t>User Authentication and Security Measures</a:t>
-            </a:r>
-          </a:p>
-        </p:txBody>
-      </p:sp>
-      <p:pic>
-        <p:nvPicPr>
-          <p:cNvPr id="5" name="Content Placeholder 4" descr="Digital security concept 3d">
-            <a:extLst>
-              <a:ext uri="{FF2B5EF4-FFF2-40B4-BE49-F238E27FC236}">
-                <a16:creationId xmlns:a16="http://schemas.microsoft.com/office/drawing/2014/main" id="{0E309C3F-DF67-450F-B048-4F70E3126529}"/>
-              </a:ext>
-            </a:extLst>
-          </p:cNvPr>
-          <p:cNvPicPr>
-            <a:picLocks noGrp="1" noChangeAspect="1"/>
-          </p:cNvPicPr>
-          <p:nvPr>
-            <p:ph sz="half" idx="1"/>
-          </p:nvPr>
-        </p:nvPicPr>
-        <p:blipFill>
-          <a:blip r:embed="rId3"/>
-          <a:srcRect l="3436" r="3299"/>
-          <a:stretch>
-            <a:fillRect/>
-          </a:stretch>
-        </p:blipFill>
-        <p:spPr>
-          <a:xfrm>
-            <a:off x="-1" y="914399"/>
-            <a:ext cx="6657255" cy="5353523"/>
-          </a:xfrm>
-          <a:prstGeom prst="rect">
-            <a:avLst/>
-          </a:prstGeom>
-        </p:spPr>
-      </p:pic>
-      <p:cxnSp>
-        <p:nvCxnSpPr>
-          <p:cNvPr id="14" name="Straight Connector 13">
-            <a:extLst>
-              <a:ext uri="{FF2B5EF4-FFF2-40B4-BE49-F238E27FC236}">
-                <a16:creationId xmlns:a16="http://schemas.microsoft.com/office/drawing/2014/main" id="{08052531-D50B-3899-B150-D05525F4F2BC}"/>
-              </a:ext>
-              <a:ext uri="{C183D7F6-B498-43B3-948B-1728B52AA6E4}">
-                <adec:decorative xmlns:adec="http://schemas.microsoft.com/office/drawing/2017/decorative" val="1"/>
-              </a:ext>
-            </a:extLst>
-          </p:cNvPr>
-          <p:cNvCxnSpPr>
-            <a:cxnSpLocks noGrp="1" noRot="1" noChangeAspect="1" noMove="1" noResize="1" noEditPoints="1" noAdjustHandles="1" noChangeArrowheads="1" noChangeShapeType="1"/>
-          </p:cNvCxnSpPr>
-          <p:nvPr>
-            <p:extLst>
-              <p:ext uri="{386F3935-93C4-4BCD-93E2-E3B085C9AB24}">
-                <p16:designElem xmlns:p16="http://schemas.microsoft.com/office/powerpoint/2015/main" val="1"/>
-              </p:ext>
-            </p:extLst>
-          </p:nvPr>
-        </p:nvCxnSpPr>
-        <p:spPr>
-          <a:xfrm flipV="1">
-            <a:off x="0" y="6267922"/>
-            <a:ext cx="6656832" cy="1"/>
-          </a:xfrm>
-          <a:prstGeom prst="line">
-            <a:avLst/>
-          </a:prstGeom>
-          <a:ln w="76200"/>
-        </p:spPr>
-        <p:style>
-          <a:lnRef idx="1">
-            <a:schemeClr val="accent1"/>
-          </a:lnRef>
-          <a:fillRef idx="0">
-            <a:schemeClr val="accent1"/>
-          </a:fillRef>
-          <a:effectRef idx="0">
-            <a:schemeClr val="accent1"/>
-          </a:effectRef>
-          <a:fontRef idx="minor">
-            <a:schemeClr val="tx1"/>
-          </a:fontRef>
-        </p:style>
-      </p:cxnSp>
-      <p:sp>
-        <p:nvSpPr>
-          <p:cNvPr id="4" name="Content Placeholder 3">
-            <a:extLst>
-              <a:ext uri="{FF2B5EF4-FFF2-40B4-BE49-F238E27FC236}">
-                <a16:creationId xmlns:a16="http://schemas.microsoft.com/office/drawing/2014/main" id="{69085623-852F-EC3C-DA0D-133AF4CBC114}"/>
-              </a:ext>
-            </a:extLst>
-          </p:cNvPr>
-          <p:cNvSpPr>
-            <a:spLocks noGrp="1"/>
-          </p:cNvSpPr>
-          <p:nvPr>
-            <p:ph sz="half" idx="2"/>
-            <p:extLst>
-              <p:ext uri="{E7BDC344-281C-4309-B0C6-D0EE65EED2A8}">
-                <p202:designPr xmlns:p202="http://schemas.microsoft.com/office/powerpoint/2020/02/main">
-                  <p202:designTagLst>
-                    <p202:designTag name="ARCH:1:CLS" val="InformationBlock"/>
-                    <p202:designTag name="ARCH:1:VSVAR" val="TitledTextBox"/>
-                  </p202:designTagLst>
-                </p202:designPr>
-              </p:ext>
-            </p:extLst>
-          </p:nvPr>
-        </p:nvSpPr>
-        <p:spPr>
-          <a:xfrm>
-            <a:off x="7269905" y="2176036"/>
-            <a:ext cx="4261104" cy="4121887"/>
-          </a:xfrm>
-        </p:spPr>
-        <p:txBody>
-          <a:bodyPr>
-            <a:normAutofit/>
-          </a:bodyPr>
-          <a:lstStyle/>
-          <a:p>
-            <a:pPr marL="0" indent="0">
-              <a:spcBef>
-                <a:spcPts val="2500"/>
-              </a:spcBef>
-              <a:buFont typeface="Arial" panose="020B0604020202020204" pitchFamily="34" charset="0"/>
-              <a:buNone/>
-            </a:pPr>
-            <a:r>
-              <a:rPr lang="en-US" sz="1400" b="1"/>
-              <a:t>Authentication Protocols</a:t>
-            </a:r>
-          </a:p>
-          <a:p>
-            <a:pPr marL="0" lvl="1" indent="0">
-              <a:buFont typeface="Arial" panose="020B0604020202020204" pitchFamily="34" charset="0"/>
-              <a:buNone/>
-            </a:pPr>
-            <a:r>
-              <a:rPr lang="en-US" sz="1400"/>
-              <a:t>JWT tokens are used to verify user identity and secure access to sensitive data.</a:t>
-            </a:r>
-          </a:p>
-          <a:p>
-            <a:pPr marL="0" indent="0">
-              <a:spcBef>
-                <a:spcPts val="2500"/>
-              </a:spcBef>
-              <a:buFont typeface="Arial" panose="020B0604020202020204" pitchFamily="34" charset="0"/>
-              <a:buNone/>
-            </a:pPr>
-            <a:r>
-              <a:rPr lang="en-US" sz="1400" b="1"/>
-              <a:t>Access Control</a:t>
-            </a:r>
-          </a:p>
-          <a:p>
-            <a:pPr marL="0" lvl="1" indent="0">
-              <a:buFont typeface="Arial" panose="020B0604020202020204" pitchFamily="34" charset="0"/>
-              <a:buNone/>
-            </a:pPr>
-            <a:r>
-              <a:rPr lang="en-US" sz="1400"/>
-              <a:t>Only authorized users are allowed to access portfolio data and API functionalities.</a:t>
-            </a:r>
-          </a:p>
-        </p:txBody>
-      </p:sp>
-    </p:spTree>
-    <p:extLst>
-      <p:ext uri="{BB962C8B-B14F-4D97-AF65-F5344CB8AC3E}">
-        <p14:creationId xmlns:p14="http://schemas.microsoft.com/office/powerpoint/2010/main" val="2246751450"/>
       </p:ext>
     </p:extLst>
   </p:cSld>
@@ -10962,6 +10693,469 @@
           <p:cNvPr id="2" name="Title 1">
             <a:extLst>
               <a:ext uri="{FF2B5EF4-FFF2-40B4-BE49-F238E27FC236}">
+                <a16:creationId xmlns:a16="http://schemas.microsoft.com/office/drawing/2014/main" id="{D898CCB8-999A-72EA-5CF0-A5178E03149F}"/>
+              </a:ext>
+            </a:extLst>
+          </p:cNvPr>
+          <p:cNvSpPr>
+            <a:spLocks noGrp="1"/>
+          </p:cNvSpPr>
+          <p:nvPr>
+            <p:ph type="title"/>
+          </p:nvPr>
+        </p:nvSpPr>
+        <p:spPr>
+          <a:xfrm>
+            <a:off x="7269904" y="914400"/>
+            <a:ext cx="4261104" cy="1097280"/>
+          </a:xfrm>
+        </p:spPr>
+        <p:txBody>
+          <a:bodyPr vert="horz" lIns="91440" tIns="45720" rIns="91440" bIns="45720" rtlCol="0" anchor="t">
+            <a:normAutofit/>
+          </a:bodyPr>
+          <a:lstStyle/>
+          <a:p>
+            <a:pPr>
+              <a:lnSpc>
+                <a:spcPct val="90000"/>
+              </a:lnSpc>
+            </a:pPr>
+            <a:r>
+              <a:rPr lang="en-US" sz="3100"/>
+              <a:t>User Authentication and Security Measures</a:t>
+            </a:r>
+          </a:p>
+        </p:txBody>
+      </p:sp>
+      <p:pic>
+        <p:nvPicPr>
+          <p:cNvPr id="5" name="Content Placeholder 4" descr="Digital security concept 3d">
+            <a:extLst>
+              <a:ext uri="{FF2B5EF4-FFF2-40B4-BE49-F238E27FC236}">
+                <a16:creationId xmlns:a16="http://schemas.microsoft.com/office/drawing/2014/main" id="{0E309C3F-DF67-450F-B048-4F70E3126529}"/>
+              </a:ext>
+            </a:extLst>
+          </p:cNvPr>
+          <p:cNvPicPr>
+            <a:picLocks noGrp="1" noChangeAspect="1"/>
+          </p:cNvPicPr>
+          <p:nvPr>
+            <p:ph sz="half" idx="1"/>
+          </p:nvPr>
+        </p:nvPicPr>
+        <p:blipFill>
+          <a:blip r:embed="rId3"/>
+          <a:srcRect l="3436" r="3299"/>
+          <a:stretch>
+            <a:fillRect/>
+          </a:stretch>
+        </p:blipFill>
+        <p:spPr>
+          <a:xfrm>
+            <a:off x="-1" y="914399"/>
+            <a:ext cx="6657255" cy="5353523"/>
+          </a:xfrm>
+          <a:prstGeom prst="rect">
+            <a:avLst/>
+          </a:prstGeom>
+        </p:spPr>
+      </p:pic>
+      <p:cxnSp>
+        <p:nvCxnSpPr>
+          <p:cNvPr id="14" name="Straight Connector 13">
+            <a:extLst>
+              <a:ext uri="{FF2B5EF4-FFF2-40B4-BE49-F238E27FC236}">
+                <a16:creationId xmlns:a16="http://schemas.microsoft.com/office/drawing/2014/main" id="{08052531-D50B-3899-B150-D05525F4F2BC}"/>
+              </a:ext>
+              <a:ext uri="{C183D7F6-B498-43B3-948B-1728B52AA6E4}">
+                <adec:decorative xmlns:adec="http://schemas.microsoft.com/office/drawing/2017/decorative" val="1"/>
+              </a:ext>
+            </a:extLst>
+          </p:cNvPr>
+          <p:cNvCxnSpPr>
+            <a:cxnSpLocks noGrp="1" noRot="1" noChangeAspect="1" noMove="1" noResize="1" noEditPoints="1" noAdjustHandles="1" noChangeArrowheads="1" noChangeShapeType="1"/>
+          </p:cNvCxnSpPr>
+          <p:nvPr>
+            <p:extLst>
+              <p:ext uri="{386F3935-93C4-4BCD-93E2-E3B085C9AB24}">
+                <p16:designElem xmlns:p16="http://schemas.microsoft.com/office/powerpoint/2015/main" val="1"/>
+              </p:ext>
+            </p:extLst>
+          </p:nvPr>
+        </p:nvCxnSpPr>
+        <p:spPr>
+          <a:xfrm flipV="1">
+            <a:off x="0" y="6267922"/>
+            <a:ext cx="6656832" cy="1"/>
+          </a:xfrm>
+          <a:prstGeom prst="line">
+            <a:avLst/>
+          </a:prstGeom>
+          <a:ln w="76200"/>
+        </p:spPr>
+        <p:style>
+          <a:lnRef idx="1">
+            <a:schemeClr val="accent1"/>
+          </a:lnRef>
+          <a:fillRef idx="0">
+            <a:schemeClr val="accent1"/>
+          </a:fillRef>
+          <a:effectRef idx="0">
+            <a:schemeClr val="accent1"/>
+          </a:effectRef>
+          <a:fontRef idx="minor">
+            <a:schemeClr val="tx1"/>
+          </a:fontRef>
+        </p:style>
+      </p:cxnSp>
+      <p:sp>
+        <p:nvSpPr>
+          <p:cNvPr id="4" name="Content Placeholder 3">
+            <a:extLst>
+              <a:ext uri="{FF2B5EF4-FFF2-40B4-BE49-F238E27FC236}">
+                <a16:creationId xmlns:a16="http://schemas.microsoft.com/office/drawing/2014/main" id="{69085623-852F-EC3C-DA0D-133AF4CBC114}"/>
+              </a:ext>
+            </a:extLst>
+          </p:cNvPr>
+          <p:cNvSpPr>
+            <a:spLocks noGrp="1"/>
+          </p:cNvSpPr>
+          <p:nvPr>
+            <p:ph sz="half" idx="2"/>
+            <p:extLst>
+              <p:ext uri="{E7BDC344-281C-4309-B0C6-D0EE65EED2A8}">
+                <p202:designPr xmlns:p202="http://schemas.microsoft.com/office/powerpoint/2020/02/main">
+                  <p202:designTagLst>
+                    <p202:designTag name="ARCH:1:CLS" val="InformationBlock"/>
+                    <p202:designTag name="ARCH:1:VSVAR" val="TitledTextBox"/>
+                  </p202:designTagLst>
+                </p202:designPr>
+              </p:ext>
+            </p:extLst>
+          </p:nvPr>
+        </p:nvSpPr>
+        <p:spPr>
+          <a:xfrm>
+            <a:off x="7269905" y="2176036"/>
+            <a:ext cx="4261104" cy="4121887"/>
+          </a:xfrm>
+        </p:spPr>
+        <p:txBody>
+          <a:bodyPr>
+            <a:normAutofit/>
+          </a:bodyPr>
+          <a:lstStyle/>
+          <a:p>
+            <a:pPr marL="0" indent="0">
+              <a:spcBef>
+                <a:spcPts val="2500"/>
+              </a:spcBef>
+              <a:buFont typeface="Arial" panose="020B0604020202020204" pitchFamily="34" charset="0"/>
+              <a:buNone/>
+            </a:pPr>
+            <a:r>
+              <a:rPr lang="en-US" sz="1400" b="1"/>
+              <a:t>Authentication Protocols</a:t>
+            </a:r>
+          </a:p>
+          <a:p>
+            <a:pPr marL="0" lvl="1" indent="0">
+              <a:buFont typeface="Arial" panose="020B0604020202020204" pitchFamily="34" charset="0"/>
+              <a:buNone/>
+            </a:pPr>
+            <a:r>
+              <a:rPr lang="en-US" sz="1400"/>
+              <a:t>JWT tokens are used to verify user identity and secure access to sensitive data.</a:t>
+            </a:r>
+          </a:p>
+          <a:p>
+            <a:pPr marL="0" indent="0">
+              <a:spcBef>
+                <a:spcPts val="2500"/>
+              </a:spcBef>
+              <a:buFont typeface="Arial" panose="020B0604020202020204" pitchFamily="34" charset="0"/>
+              <a:buNone/>
+            </a:pPr>
+            <a:r>
+              <a:rPr lang="en-US" sz="1400" b="1"/>
+              <a:t>Access Control</a:t>
+            </a:r>
+          </a:p>
+          <a:p>
+            <a:pPr marL="0" lvl="1" indent="0">
+              <a:buFont typeface="Arial" panose="020B0604020202020204" pitchFamily="34" charset="0"/>
+              <a:buNone/>
+            </a:pPr>
+            <a:r>
+              <a:rPr lang="en-US" sz="1400"/>
+              <a:t>Only authorized users are allowed to access portfolio data and API functionalities.</a:t>
+            </a:r>
+          </a:p>
+        </p:txBody>
+      </p:sp>
+    </p:spTree>
+    <p:extLst>
+      <p:ext uri="{BB962C8B-B14F-4D97-AF65-F5344CB8AC3E}">
+        <p14:creationId xmlns:p14="http://schemas.microsoft.com/office/powerpoint/2010/main" val="2246751450"/>
+      </p:ext>
+    </p:extLst>
+  </p:cSld>
+  <p:clrMapOvr>
+    <a:masterClrMapping/>
+  </p:clrMapOvr>
+  <p:transition>
+    <p:fade/>
+  </p:transition>
+  <p:timing>
+    <p:tnLst>
+      <p:par>
+        <p:cTn id="1" dur="indefinite" restart="never" nodeType="tmRoot">
+          <p:childTnLst>
+            <p:seq concurrent="1" nextAc="seek">
+              <p:cTn id="2" dur="indefinite" nodeType="mainSeq">
+                <p:childTnLst>
+                  <p:par>
+                    <p:cTn id="3" fill="hold">
+                      <p:stCondLst>
+                        <p:cond delay="indefinite"/>
+                        <p:cond evt="onBegin" delay="0">
+                          <p:tn val="2"/>
+                        </p:cond>
+                      </p:stCondLst>
+                      <p:childTnLst>
+                        <p:par>
+                          <p:cTn id="4" fill="hold">
+                            <p:stCondLst>
+                              <p:cond delay="0"/>
+                            </p:stCondLst>
+                            <p:childTnLst>
+                              <p:par>
+                                <p:cTn id="5" presetID="10" presetClass="entr" presetSubtype="0" fill="hold" grpId="0" nodeType="withEffect">
+                                  <p:stCondLst>
+                                    <p:cond delay="250"/>
+                                  </p:stCondLst>
+                                  <p:iterate>
+                                    <p:tmPct val="10000"/>
+                                  </p:iterate>
+                                  <p:childTnLst>
+                                    <p:set>
+                                      <p:cBhvr>
+                                        <p:cTn id="6" dur="1" fill="hold">
+                                          <p:stCondLst>
+                                            <p:cond delay="0"/>
+                                          </p:stCondLst>
+                                        </p:cTn>
+                                        <p:tgtEl>
+                                          <p:spTgt spid="4"/>
+                                        </p:tgtEl>
+                                        <p:attrNameLst>
+                                          <p:attrName>style.visibility</p:attrName>
+                                        </p:attrNameLst>
+                                      </p:cBhvr>
+                                      <p:to>
+                                        <p:strVal val="visible"/>
+                                      </p:to>
+                                    </p:set>
+                                    <p:animEffect transition="in" filter="fade">
+                                      <p:cBhvr>
+                                        <p:cTn id="7" dur="500"/>
+                                        <p:tgtEl>
+                                          <p:spTgt spid="4"/>
+                                        </p:tgtEl>
+                                      </p:cBhvr>
+                                    </p:animEffect>
+                                  </p:childTnLst>
+                                </p:cTn>
+                              </p:par>
+                            </p:childTnLst>
+                          </p:cTn>
+                        </p:par>
+                      </p:childTnLst>
+                    </p:cTn>
+                  </p:par>
+                </p:childTnLst>
+              </p:cTn>
+              <p:prevCondLst>
+                <p:cond evt="onPrev" delay="0">
+                  <p:tgtEl>
+                    <p:sldTgt/>
+                  </p:tgtEl>
+                </p:cond>
+              </p:prevCondLst>
+              <p:nextCondLst>
+                <p:cond evt="onNext" delay="0">
+                  <p:tgtEl>
+                    <p:sldTgt/>
+                  </p:tgtEl>
+                </p:cond>
+              </p:nextCondLst>
+            </p:seq>
+          </p:childTnLst>
+        </p:cTn>
+      </p:par>
+    </p:tnLst>
+    <p:bldLst>
+      <p:bldP spid="4" grpId="0"/>
+    </p:bldLst>
+  </p:timing>
+</p:sld>
+</file>
+
+<file path=ppt/slides/slide15.xml><?xml version="1.0" encoding="utf-8"?>
+<p:sld xmlns:a="http://schemas.openxmlformats.org/drawingml/2006/main" xmlns:r="http://schemas.openxmlformats.org/officeDocument/2006/relationships" xmlns:p="http://schemas.openxmlformats.org/presentationml/2006/main">
+  <p:cSld>
+    <p:bg>
+      <p:bgPr>
+        <a:solidFill>
+          <a:schemeClr val="bg1"/>
+        </a:solidFill>
+        <a:effectLst/>
+      </p:bgPr>
+    </p:bg>
+    <p:spTree>
+      <p:nvGrpSpPr>
+        <p:cNvPr id="1" name=""/>
+        <p:cNvGrpSpPr/>
+        <p:nvPr/>
+      </p:nvGrpSpPr>
+      <p:grpSpPr>
+        <a:xfrm>
+          <a:off x="0" y="0"/>
+          <a:ext cx="0" cy="0"/>
+          <a:chOff x="0" y="0"/>
+          <a:chExt cx="0" cy="0"/>
+        </a:xfrm>
+      </p:grpSpPr>
+      <p:cxnSp>
+        <p:nvCxnSpPr>
+          <p:cNvPr id="10" name="Straight Connector 9">
+            <a:extLst>
+              <a:ext uri="{FF2B5EF4-FFF2-40B4-BE49-F238E27FC236}">
+                <a16:creationId xmlns:a16="http://schemas.microsoft.com/office/drawing/2014/main" id="{118E06E4-607B-144B-382B-AD3D06B1EE8C}"/>
+              </a:ext>
+              <a:ext uri="{C183D7F6-B498-43B3-948B-1728B52AA6E4}">
+                <adec:decorative xmlns:adec="http://schemas.microsoft.com/office/drawing/2017/decorative" val="1"/>
+              </a:ext>
+            </a:extLst>
+          </p:cNvPr>
+          <p:cNvCxnSpPr>
+            <a:cxnSpLocks noGrp="1" noRot="1" noChangeAspect="1" noMove="1" noResize="1" noEditPoints="1" noAdjustHandles="1" noChangeArrowheads="1" noChangeShapeType="1"/>
+          </p:cNvCxnSpPr>
+          <p:nvPr>
+            <p:extLst>
+              <p:ext uri="{386F3935-93C4-4BCD-93E2-E3B085C9AB24}">
+                <p16:designElem xmlns:p16="http://schemas.microsoft.com/office/powerpoint/2015/main" val="1"/>
+              </p:ext>
+            </p:extLst>
+          </p:nvPr>
+        </p:nvCxnSpPr>
+        <p:spPr>
+          <a:xfrm>
+            <a:off x="713232" y="1031001"/>
+            <a:ext cx="978862" cy="0"/>
+          </a:xfrm>
+          <a:prstGeom prst="line">
+            <a:avLst/>
+          </a:prstGeom>
+          <a:ln w="76200"/>
+        </p:spPr>
+        <p:style>
+          <a:lnRef idx="1">
+            <a:schemeClr val="accent1"/>
+          </a:lnRef>
+          <a:fillRef idx="0">
+            <a:schemeClr val="accent1"/>
+          </a:fillRef>
+          <a:effectRef idx="0">
+            <a:schemeClr val="accent1"/>
+          </a:effectRef>
+          <a:fontRef idx="minor">
+            <a:schemeClr val="tx1"/>
+          </a:fontRef>
+        </p:style>
+      </p:cxnSp>
+      <p:sp useBgFill="1">
+        <p:nvSpPr>
+          <p:cNvPr id="12" name="Rectangle 11">
+            <a:extLst>
+              <a:ext uri="{FF2B5EF4-FFF2-40B4-BE49-F238E27FC236}">
+                <a16:creationId xmlns:a16="http://schemas.microsoft.com/office/drawing/2014/main" id="{744CAA32-F237-419C-A2DD-43C28D920D3C}"/>
+              </a:ext>
+              <a:ext uri="{C183D7F6-B498-43B3-948B-1728B52AA6E4}">
+                <adec:decorative xmlns:adec="http://schemas.microsoft.com/office/drawing/2017/decorative" val="1"/>
+              </a:ext>
+            </a:extLst>
+          </p:cNvPr>
+          <p:cNvSpPr>
+            <a:spLocks noGrp="1" noRot="1" noChangeAspect="1" noMove="1" noResize="1" noEditPoints="1" noAdjustHandles="1" noChangeArrowheads="1" noChangeShapeType="1" noTextEdit="1"/>
+          </p:cNvSpPr>
+          <p:nvPr>
+            <p:extLst>
+              <p:ext uri="{386F3935-93C4-4BCD-93E2-E3B085C9AB24}">
+                <p16:designElem xmlns:p16="http://schemas.microsoft.com/office/powerpoint/2015/main" val="1"/>
+              </p:ext>
+            </p:extLst>
+          </p:nvPr>
+        </p:nvSpPr>
+        <p:spPr>
+          <a:xfrm>
+            <a:off x="0" y="0"/>
+            <a:ext cx="12192000" cy="6858000"/>
+          </a:xfrm>
+          <a:prstGeom prst="rect">
+            <a:avLst/>
+          </a:prstGeom>
+          <a:ln w="12700" cap="flat" cmpd="sng" algn="ctr">
+            <a:noFill/>
+            <a:prstDash val="solid"/>
+            <a:miter lim="800000"/>
+          </a:ln>
+          <a:effectLst/>
+          <a:extLst>
+            <a:ext uri="{91240B29-F687-4F45-9708-019B960494DF}">
+              <a14:hiddenLine xmlns:a14="http://schemas.microsoft.com/office/drawing/2010/main" w="12700" cap="flat" cmpd="sng" algn="ctr">
+                <a:solidFill>
+                  <a:schemeClr val="accent1">
+                    <a:shade val="50000"/>
+                  </a:schemeClr>
+                </a:solidFill>
+                <a:prstDash val="solid"/>
+                <a:miter lim="800000"/>
+              </a14:hiddenLine>
+            </a:ext>
+          </a:extLst>
+        </p:spPr>
+        <p:style>
+          <a:lnRef idx="2">
+            <a:schemeClr val="accent1">
+              <a:shade val="50000"/>
+            </a:schemeClr>
+          </a:lnRef>
+          <a:fillRef idx="1">
+            <a:schemeClr val="accent1"/>
+          </a:fillRef>
+          <a:effectRef idx="0">
+            <a:schemeClr val="accent1"/>
+          </a:effectRef>
+          <a:fontRef idx="minor">
+            <a:schemeClr val="lt1"/>
+          </a:fontRef>
+        </p:style>
+        <p:txBody>
+          <a:bodyPr rtlCol="0" anchor="ctr"/>
+          <a:lstStyle/>
+          <a:p>
+            <a:pPr algn="ctr"/>
+            <a:endParaRPr lang="en-US"/>
+          </a:p>
+        </p:txBody>
+      </p:sp>
+      <p:sp>
+        <p:nvSpPr>
+          <p:cNvPr id="2" name="Title 1">
+            <a:extLst>
+              <a:ext uri="{FF2B5EF4-FFF2-40B4-BE49-F238E27FC236}">
                 <a16:creationId xmlns:a16="http://schemas.microsoft.com/office/drawing/2014/main" id="{F568756F-F386-61D5-BEF0-E2A71F6AB206}"/>
               </a:ext>
             </a:extLst>
@@ -11294,7 +11488,7 @@
 </p:sld>
 </file>
 
-<file path=ppt/slides/slide15.xml><?xml version="1.0" encoding="utf-8"?>
+<file path=ppt/slides/slide16.xml><?xml version="1.0" encoding="utf-8"?>
 <p:sld xmlns:a="http://schemas.openxmlformats.org/drawingml/2006/main" xmlns:r="http://schemas.openxmlformats.org/officeDocument/2006/relationships" xmlns:p="http://schemas.openxmlformats.org/presentationml/2006/main">
   <p:cSld>
     <p:bg>
@@ -11707,7 +11901,7 @@
 </p:sld>
 </file>
 
-<file path=ppt/slides/slide16.xml><?xml version="1.0" encoding="utf-8"?>
+<file path=ppt/slides/slide17.xml><?xml version="1.0" encoding="utf-8"?>
 <p:sld xmlns:a="http://schemas.openxmlformats.org/drawingml/2006/main" xmlns:r="http://schemas.openxmlformats.org/officeDocument/2006/relationships" xmlns:p="http://schemas.openxmlformats.org/presentationml/2006/main">
   <p:cSld>
     <p:bg>
@@ -12089,492 +12283,6 @@
     <p:extLst>
       <p:ext uri="{BB962C8B-B14F-4D97-AF65-F5344CB8AC3E}">
         <p14:creationId xmlns:p14="http://schemas.microsoft.com/office/powerpoint/2010/main" val="2074572007"/>
-      </p:ext>
-    </p:extLst>
-  </p:cSld>
-  <p:clrMapOvr>
-    <a:masterClrMapping/>
-  </p:clrMapOvr>
-  <p:transition>
-    <p:fade/>
-  </p:transition>
-  <p:timing>
-    <p:tnLst>
-      <p:par>
-        <p:cTn id="1" dur="indefinite" restart="never" nodeType="tmRoot">
-          <p:childTnLst>
-            <p:seq concurrent="1" nextAc="seek">
-              <p:cTn id="2" dur="indefinite" nodeType="mainSeq">
-                <p:childTnLst>
-                  <p:par>
-                    <p:cTn id="3" fill="hold">
-                      <p:stCondLst>
-                        <p:cond delay="indefinite"/>
-                        <p:cond evt="onBegin" delay="0">
-                          <p:tn val="2"/>
-                        </p:cond>
-                      </p:stCondLst>
-                      <p:childTnLst>
-                        <p:par>
-                          <p:cTn id="4" fill="hold">
-                            <p:stCondLst>
-                              <p:cond delay="0"/>
-                            </p:stCondLst>
-                            <p:childTnLst>
-                              <p:par>
-                                <p:cTn id="5" presetID="10" presetClass="entr" presetSubtype="0" fill="hold" grpId="0" nodeType="withEffect">
-                                  <p:stCondLst>
-                                    <p:cond delay="250"/>
-                                  </p:stCondLst>
-                                  <p:iterate>
-                                    <p:tmPct val="10000"/>
-                                  </p:iterate>
-                                  <p:childTnLst>
-                                    <p:set>
-                                      <p:cBhvr>
-                                        <p:cTn id="6" dur="1" fill="hold">
-                                          <p:stCondLst>
-                                            <p:cond delay="0"/>
-                                          </p:stCondLst>
-                                        </p:cTn>
-                                        <p:tgtEl>
-                                          <p:spTgt spid="4"/>
-                                        </p:tgtEl>
-                                        <p:attrNameLst>
-                                          <p:attrName>style.visibility</p:attrName>
-                                        </p:attrNameLst>
-                                      </p:cBhvr>
-                                      <p:to>
-                                        <p:strVal val="visible"/>
-                                      </p:to>
-                                    </p:set>
-                                    <p:animEffect transition="in" filter="fade">
-                                      <p:cBhvr>
-                                        <p:cTn id="7" dur="500"/>
-                                        <p:tgtEl>
-                                          <p:spTgt spid="4"/>
-                                        </p:tgtEl>
-                                      </p:cBhvr>
-                                    </p:animEffect>
-                                  </p:childTnLst>
-                                </p:cTn>
-                              </p:par>
-                            </p:childTnLst>
-                          </p:cTn>
-                        </p:par>
-                      </p:childTnLst>
-                    </p:cTn>
-                  </p:par>
-                </p:childTnLst>
-              </p:cTn>
-              <p:prevCondLst>
-                <p:cond evt="onPrev" delay="0">
-                  <p:tgtEl>
-                    <p:sldTgt/>
-                  </p:tgtEl>
-                </p:cond>
-              </p:prevCondLst>
-              <p:nextCondLst>
-                <p:cond evt="onNext" delay="0">
-                  <p:tgtEl>
-                    <p:sldTgt/>
-                  </p:tgtEl>
-                </p:cond>
-              </p:nextCondLst>
-            </p:seq>
-          </p:childTnLst>
-        </p:cTn>
-      </p:par>
-    </p:tnLst>
-    <p:bldLst>
-      <p:bldP spid="4" grpId="0"/>
-    </p:bldLst>
-  </p:timing>
-</p:sld>
-</file>
-
-<file path=ppt/slides/slide17.xml><?xml version="1.0" encoding="utf-8"?>
-<p:sld xmlns:a="http://schemas.openxmlformats.org/drawingml/2006/main" xmlns:r="http://schemas.openxmlformats.org/officeDocument/2006/relationships" xmlns:p="http://schemas.openxmlformats.org/presentationml/2006/main">
-  <p:cSld>
-    <p:bg>
-      <p:bgPr>
-        <a:solidFill>
-          <a:schemeClr val="bg1"/>
-        </a:solidFill>
-        <a:effectLst/>
-      </p:bgPr>
-    </p:bg>
-    <p:spTree>
-      <p:nvGrpSpPr>
-        <p:cNvPr id="1" name=""/>
-        <p:cNvGrpSpPr/>
-        <p:nvPr/>
-      </p:nvGrpSpPr>
-      <p:grpSpPr>
-        <a:xfrm>
-          <a:off x="0" y="0"/>
-          <a:ext cx="0" cy="0"/>
-          <a:chOff x="0" y="0"/>
-          <a:chExt cx="0" cy="0"/>
-        </a:xfrm>
-      </p:grpSpPr>
-      <p:cxnSp>
-        <p:nvCxnSpPr>
-          <p:cNvPr id="10" name="Straight Connector 9">
-            <a:extLst>
-              <a:ext uri="{FF2B5EF4-FFF2-40B4-BE49-F238E27FC236}">
-                <a16:creationId xmlns:a16="http://schemas.microsoft.com/office/drawing/2014/main" id="{118E06E4-607B-144B-382B-AD3D06B1EE8C}"/>
-              </a:ext>
-              <a:ext uri="{C183D7F6-B498-43B3-948B-1728B52AA6E4}">
-                <adec:decorative xmlns:adec="http://schemas.microsoft.com/office/drawing/2017/decorative" val="1"/>
-              </a:ext>
-            </a:extLst>
-          </p:cNvPr>
-          <p:cNvCxnSpPr>
-            <a:cxnSpLocks noGrp="1" noRot="1" noChangeAspect="1" noMove="1" noResize="1" noEditPoints="1" noAdjustHandles="1" noChangeArrowheads="1" noChangeShapeType="1"/>
-          </p:cNvCxnSpPr>
-          <p:nvPr>
-            <p:extLst>
-              <p:ext uri="{386F3935-93C4-4BCD-93E2-E3B085C9AB24}">
-                <p16:designElem xmlns:p16="http://schemas.microsoft.com/office/powerpoint/2015/main" val="1"/>
-              </p:ext>
-            </p:extLst>
-          </p:nvPr>
-        </p:nvCxnSpPr>
-        <p:spPr>
-          <a:xfrm>
-            <a:off x="713232" y="1031001"/>
-            <a:ext cx="978862" cy="0"/>
-          </a:xfrm>
-          <a:prstGeom prst="line">
-            <a:avLst/>
-          </a:prstGeom>
-          <a:ln w="76200"/>
-        </p:spPr>
-        <p:style>
-          <a:lnRef idx="1">
-            <a:schemeClr val="accent1"/>
-          </a:lnRef>
-          <a:fillRef idx="0">
-            <a:schemeClr val="accent1"/>
-          </a:fillRef>
-          <a:effectRef idx="0">
-            <a:schemeClr val="accent1"/>
-          </a:effectRef>
-          <a:fontRef idx="minor">
-            <a:schemeClr val="tx1"/>
-          </a:fontRef>
-        </p:style>
-      </p:cxnSp>
-      <p:sp useBgFill="1">
-        <p:nvSpPr>
-          <p:cNvPr id="12" name="Rectangle 11">
-            <a:extLst>
-              <a:ext uri="{FF2B5EF4-FFF2-40B4-BE49-F238E27FC236}">
-                <a16:creationId xmlns:a16="http://schemas.microsoft.com/office/drawing/2014/main" id="{744CAA32-F237-419C-A2DD-43C28D920D3C}"/>
-              </a:ext>
-              <a:ext uri="{C183D7F6-B498-43B3-948B-1728B52AA6E4}">
-                <adec:decorative xmlns:adec="http://schemas.microsoft.com/office/drawing/2017/decorative" val="1"/>
-              </a:ext>
-            </a:extLst>
-          </p:cNvPr>
-          <p:cNvSpPr>
-            <a:spLocks noGrp="1" noRot="1" noChangeAspect="1" noMove="1" noResize="1" noEditPoints="1" noAdjustHandles="1" noChangeArrowheads="1" noChangeShapeType="1" noTextEdit="1"/>
-          </p:cNvSpPr>
-          <p:nvPr>
-            <p:extLst>
-              <p:ext uri="{386F3935-93C4-4BCD-93E2-E3B085C9AB24}">
-                <p16:designElem xmlns:p16="http://schemas.microsoft.com/office/powerpoint/2015/main" val="1"/>
-              </p:ext>
-            </p:extLst>
-          </p:nvPr>
-        </p:nvSpPr>
-        <p:spPr>
-          <a:xfrm>
-            <a:off x="0" y="0"/>
-            <a:ext cx="12192000" cy="6858000"/>
-          </a:xfrm>
-          <a:prstGeom prst="rect">
-            <a:avLst/>
-          </a:prstGeom>
-          <a:ln w="12700" cap="flat" cmpd="sng" algn="ctr">
-            <a:noFill/>
-            <a:prstDash val="solid"/>
-            <a:miter lim="800000"/>
-          </a:ln>
-          <a:effectLst/>
-          <a:extLst>
-            <a:ext uri="{91240B29-F687-4F45-9708-019B960494DF}">
-              <a14:hiddenLine xmlns:a14="http://schemas.microsoft.com/office/drawing/2010/main" w="12700" cap="flat" cmpd="sng" algn="ctr">
-                <a:solidFill>
-                  <a:schemeClr val="accent1">
-                    <a:shade val="50000"/>
-                  </a:schemeClr>
-                </a:solidFill>
-                <a:prstDash val="solid"/>
-                <a:miter lim="800000"/>
-              </a14:hiddenLine>
-            </a:ext>
-          </a:extLst>
-        </p:spPr>
-        <p:style>
-          <a:lnRef idx="2">
-            <a:schemeClr val="accent1">
-              <a:shade val="50000"/>
-            </a:schemeClr>
-          </a:lnRef>
-          <a:fillRef idx="1">
-            <a:schemeClr val="accent1"/>
-          </a:fillRef>
-          <a:effectRef idx="0">
-            <a:schemeClr val="accent1"/>
-          </a:effectRef>
-          <a:fontRef idx="minor">
-            <a:schemeClr val="lt1"/>
-          </a:fontRef>
-        </p:style>
-        <p:txBody>
-          <a:bodyPr rtlCol="0" anchor="ctr"/>
-          <a:lstStyle/>
-          <a:p>
-            <a:pPr algn="ctr"/>
-            <a:endParaRPr lang="en-US"/>
-          </a:p>
-        </p:txBody>
-      </p:sp>
-      <p:sp>
-        <p:nvSpPr>
-          <p:cNvPr id="2" name="Title 1">
-            <a:extLst>
-              <a:ext uri="{FF2B5EF4-FFF2-40B4-BE49-F238E27FC236}">
-                <a16:creationId xmlns:a16="http://schemas.microsoft.com/office/drawing/2014/main" id="{CF3EA3AC-9AAE-8391-9396-0FE46B14FAB2}"/>
-              </a:ext>
-            </a:extLst>
-          </p:cNvPr>
-          <p:cNvSpPr>
-            <a:spLocks noGrp="1"/>
-          </p:cNvSpPr>
-          <p:nvPr>
-            <p:ph type="title"/>
-          </p:nvPr>
-        </p:nvSpPr>
-        <p:spPr>
-          <a:xfrm>
-            <a:off x="5029200" y="914400"/>
-            <a:ext cx="6501810" cy="1097280"/>
-          </a:xfrm>
-        </p:spPr>
-        <p:txBody>
-          <a:bodyPr vert="horz" lIns="91440" tIns="45720" rIns="91440" bIns="45720" rtlCol="0" anchor="t">
-            <a:normAutofit/>
-          </a:bodyPr>
-          <a:lstStyle/>
-          <a:p>
-            <a:pPr>
-              <a:lnSpc>
-                <a:spcPct val="90000"/>
-              </a:lnSpc>
-            </a:pPr>
-            <a:r>
-              <a:rPr lang="en-US" sz="3400"/>
-              <a:t>Deployment Process and Hosting Options</a:t>
-            </a:r>
-          </a:p>
-        </p:txBody>
-      </p:sp>
-      <p:pic>
-        <p:nvPicPr>
-          <p:cNvPr id="5" name="Content Placeholder 4" descr="Big Data, Cloud Computing, Block Chain, Hybrid Cloud, Multi Cloud, web3, metaverse">
-            <a:extLst>
-              <a:ext uri="{FF2B5EF4-FFF2-40B4-BE49-F238E27FC236}">
-                <a16:creationId xmlns:a16="http://schemas.microsoft.com/office/drawing/2014/main" id="{206C0095-D5A3-4040-886F-9547CBB60646}"/>
-              </a:ext>
-            </a:extLst>
-          </p:cNvPr>
-          <p:cNvPicPr>
-            <a:picLocks noGrp="1" noChangeAspect="1"/>
-          </p:cNvPicPr>
-          <p:nvPr>
-            <p:ph sz="half" idx="1"/>
-          </p:nvPr>
-        </p:nvPicPr>
-        <p:blipFill>
-          <a:blip r:embed="rId3"/>
-          <a:srcRect l="36665" r="18993"/>
-          <a:stretch>
-            <a:fillRect/>
-          </a:stretch>
-        </p:blipFill>
-        <p:spPr>
-          <a:xfrm>
-            <a:off x="20" y="914399"/>
-            <a:ext cx="4416532" cy="5353523"/>
-          </a:xfrm>
-          <a:prstGeom prst="rect">
-            <a:avLst/>
-          </a:prstGeom>
-        </p:spPr>
-      </p:pic>
-      <p:cxnSp>
-        <p:nvCxnSpPr>
-          <p:cNvPr id="14" name="Straight Connector 13">
-            <a:extLst>
-              <a:ext uri="{FF2B5EF4-FFF2-40B4-BE49-F238E27FC236}">
-                <a16:creationId xmlns:a16="http://schemas.microsoft.com/office/drawing/2014/main" id="{08052531-D50B-3899-B150-D05525F4F2BC}"/>
-              </a:ext>
-              <a:ext uri="{C183D7F6-B498-43B3-948B-1728B52AA6E4}">
-                <adec:decorative xmlns:adec="http://schemas.microsoft.com/office/drawing/2017/decorative" val="1"/>
-              </a:ext>
-            </a:extLst>
-          </p:cNvPr>
-          <p:cNvCxnSpPr>
-            <a:cxnSpLocks noGrp="1" noRot="1" noChangeAspect="1" noMove="1" noResize="1" noEditPoints="1" noAdjustHandles="1" noChangeArrowheads="1" noChangeShapeType="1"/>
-          </p:cNvCxnSpPr>
-          <p:nvPr>
-            <p:extLst>
-              <p:ext uri="{386F3935-93C4-4BCD-93E2-E3B085C9AB24}">
-                <p16:designElem xmlns:p16="http://schemas.microsoft.com/office/powerpoint/2015/main" val="1"/>
-              </p:ext>
-            </p:extLst>
-          </p:nvPr>
-        </p:nvCxnSpPr>
-        <p:spPr>
-          <a:xfrm flipV="1">
-            <a:off x="0" y="6267922"/>
-            <a:ext cx="4416552" cy="1"/>
-          </a:xfrm>
-          <a:prstGeom prst="line">
-            <a:avLst/>
-          </a:prstGeom>
-          <a:ln w="76200"/>
-        </p:spPr>
-        <p:style>
-          <a:lnRef idx="1">
-            <a:schemeClr val="accent1"/>
-          </a:lnRef>
-          <a:fillRef idx="0">
-            <a:schemeClr val="accent1"/>
-          </a:fillRef>
-          <a:effectRef idx="0">
-            <a:schemeClr val="accent1"/>
-          </a:effectRef>
-          <a:fontRef idx="minor">
-            <a:schemeClr val="tx1"/>
-          </a:fontRef>
-        </p:style>
-      </p:cxnSp>
-      <p:sp>
-        <p:nvSpPr>
-          <p:cNvPr id="4" name="Content Placeholder 3">
-            <a:extLst>
-              <a:ext uri="{FF2B5EF4-FFF2-40B4-BE49-F238E27FC236}">
-                <a16:creationId xmlns:a16="http://schemas.microsoft.com/office/drawing/2014/main" id="{4117039B-F650-1E14-349D-29289DA22E2B}"/>
-              </a:ext>
-            </a:extLst>
-          </p:cNvPr>
-          <p:cNvSpPr>
-            <a:spLocks noGrp="1"/>
-          </p:cNvSpPr>
-          <p:nvPr>
-            <p:ph sz="half" idx="2"/>
-            <p:extLst>
-              <p:ext uri="{E7BDC344-281C-4309-B0C6-D0EE65EED2A8}">
-                <p202:designPr xmlns:p202="http://schemas.microsoft.com/office/powerpoint/2020/02/main">
-                  <p202:designTagLst>
-                    <p202:designTag name="ARCH:1:CLS" val="InformationBlock"/>
-                    <p202:designTag name="ARCH:1:VSVAR" val="TitledTextBox"/>
-                  </p202:designTagLst>
-                </p202:designPr>
-              </p:ext>
-            </p:extLst>
-          </p:nvPr>
-        </p:nvSpPr>
-        <p:spPr>
-          <a:xfrm>
-            <a:off x="5029200" y="2176036"/>
-            <a:ext cx="6501810" cy="4121885"/>
-          </a:xfrm>
-        </p:spPr>
-        <p:txBody>
-          <a:bodyPr>
-            <a:normAutofit/>
-          </a:bodyPr>
-          <a:lstStyle/>
-          <a:p>
-            <a:pPr marL="0" indent="0">
-              <a:spcBef>
-                <a:spcPts val="2500"/>
-              </a:spcBef>
-              <a:buFont typeface="Arial" panose="020B0604020202020204" pitchFamily="34" charset="0"/>
-              <a:buNone/>
-            </a:pPr>
-            <a:r>
-              <a:rPr lang="en-GB" sz="1400" b="1"/>
-              <a:t>Cloud Platform Deployment</a:t>
-            </a:r>
-          </a:p>
-          <a:p>
-            <a:pPr marL="0" lvl="1" indent="0">
-              <a:buFont typeface="Arial" panose="020B0604020202020204" pitchFamily="34" charset="0"/>
-              <a:buNone/>
-            </a:pPr>
-            <a:r>
-              <a:rPr lang="en-GB" sz="1400"/>
-              <a:t>The API is hosted on cloud platforms that provide scalable infrastructure for Java application deployment.</a:t>
-            </a:r>
-          </a:p>
-          <a:p>
-            <a:pPr marL="0" indent="0">
-              <a:spcBef>
-                <a:spcPts val="2500"/>
-              </a:spcBef>
-              <a:buFont typeface="Arial" panose="020B0604020202020204" pitchFamily="34" charset="0"/>
-              <a:buNone/>
-            </a:pPr>
-            <a:r>
-              <a:rPr lang="en-GB" sz="1400" b="1"/>
-              <a:t>Containerization Technology</a:t>
-            </a:r>
-          </a:p>
-          <a:p>
-            <a:pPr marL="0" lvl="1" indent="0">
-              <a:buFont typeface="Arial" panose="020B0604020202020204" pitchFamily="34" charset="0"/>
-              <a:buNone/>
-            </a:pPr>
-            <a:r>
-              <a:rPr lang="en-GB" sz="1400"/>
-              <a:t>Containerization enables consistent environments and easy application packaging for deployment and scaling.</a:t>
-            </a:r>
-          </a:p>
-          <a:p>
-            <a:pPr marL="0" indent="0">
-              <a:spcBef>
-                <a:spcPts val="2500"/>
-              </a:spcBef>
-              <a:buFont typeface="Arial" panose="020B0604020202020204" pitchFamily="34" charset="0"/>
-              <a:buNone/>
-            </a:pPr>
-            <a:r>
-              <a:rPr lang="en-GB" sz="1400" b="1"/>
-              <a:t>Continuous Integration Pipelines</a:t>
-            </a:r>
-          </a:p>
-          <a:p>
-            <a:pPr marL="0" lvl="1" indent="0">
-              <a:buFont typeface="Arial" panose="020B0604020202020204" pitchFamily="34" charset="0"/>
-              <a:buNone/>
-            </a:pPr>
-            <a:r>
-              <a:rPr lang="en-GB" sz="1400"/>
-              <a:t>Continuous integration pipelines automate testing and deployment, ensuring smooth delivery and updates.</a:t>
-            </a:r>
-          </a:p>
-        </p:txBody>
-      </p:sp>
-    </p:spTree>
-    <p:extLst>
-      <p:ext uri="{BB962C8B-B14F-4D97-AF65-F5344CB8AC3E}">
-        <p14:creationId xmlns:p14="http://schemas.microsoft.com/office/powerpoint/2010/main" val="27872024"/>
       </p:ext>
     </p:extLst>
   </p:cSld>
@@ -12833,6 +12541,492 @@
           <p:cNvPr id="2" name="Title 1">
             <a:extLst>
               <a:ext uri="{FF2B5EF4-FFF2-40B4-BE49-F238E27FC236}">
+                <a16:creationId xmlns:a16="http://schemas.microsoft.com/office/drawing/2014/main" id="{CF3EA3AC-9AAE-8391-9396-0FE46B14FAB2}"/>
+              </a:ext>
+            </a:extLst>
+          </p:cNvPr>
+          <p:cNvSpPr>
+            <a:spLocks noGrp="1"/>
+          </p:cNvSpPr>
+          <p:nvPr>
+            <p:ph type="title"/>
+          </p:nvPr>
+        </p:nvSpPr>
+        <p:spPr>
+          <a:xfrm>
+            <a:off x="5029200" y="914400"/>
+            <a:ext cx="6501810" cy="1097280"/>
+          </a:xfrm>
+        </p:spPr>
+        <p:txBody>
+          <a:bodyPr vert="horz" lIns="91440" tIns="45720" rIns="91440" bIns="45720" rtlCol="0" anchor="t">
+            <a:normAutofit/>
+          </a:bodyPr>
+          <a:lstStyle/>
+          <a:p>
+            <a:pPr>
+              <a:lnSpc>
+                <a:spcPct val="90000"/>
+              </a:lnSpc>
+            </a:pPr>
+            <a:r>
+              <a:rPr lang="en-US" sz="3400"/>
+              <a:t>Deployment Process and Hosting Options</a:t>
+            </a:r>
+          </a:p>
+        </p:txBody>
+      </p:sp>
+      <p:pic>
+        <p:nvPicPr>
+          <p:cNvPr id="5" name="Content Placeholder 4" descr="Big Data, Cloud Computing, Block Chain, Hybrid Cloud, Multi Cloud, web3, metaverse">
+            <a:extLst>
+              <a:ext uri="{FF2B5EF4-FFF2-40B4-BE49-F238E27FC236}">
+                <a16:creationId xmlns:a16="http://schemas.microsoft.com/office/drawing/2014/main" id="{206C0095-D5A3-4040-886F-9547CBB60646}"/>
+              </a:ext>
+            </a:extLst>
+          </p:cNvPr>
+          <p:cNvPicPr>
+            <a:picLocks noGrp="1" noChangeAspect="1"/>
+          </p:cNvPicPr>
+          <p:nvPr>
+            <p:ph sz="half" idx="1"/>
+          </p:nvPr>
+        </p:nvPicPr>
+        <p:blipFill>
+          <a:blip r:embed="rId3"/>
+          <a:srcRect l="36665" r="18993"/>
+          <a:stretch>
+            <a:fillRect/>
+          </a:stretch>
+        </p:blipFill>
+        <p:spPr>
+          <a:xfrm>
+            <a:off x="20" y="914399"/>
+            <a:ext cx="4416532" cy="5353523"/>
+          </a:xfrm>
+          <a:prstGeom prst="rect">
+            <a:avLst/>
+          </a:prstGeom>
+        </p:spPr>
+      </p:pic>
+      <p:cxnSp>
+        <p:nvCxnSpPr>
+          <p:cNvPr id="14" name="Straight Connector 13">
+            <a:extLst>
+              <a:ext uri="{FF2B5EF4-FFF2-40B4-BE49-F238E27FC236}">
+                <a16:creationId xmlns:a16="http://schemas.microsoft.com/office/drawing/2014/main" id="{08052531-D50B-3899-B150-D05525F4F2BC}"/>
+              </a:ext>
+              <a:ext uri="{C183D7F6-B498-43B3-948B-1728B52AA6E4}">
+                <adec:decorative xmlns:adec="http://schemas.microsoft.com/office/drawing/2017/decorative" val="1"/>
+              </a:ext>
+            </a:extLst>
+          </p:cNvPr>
+          <p:cNvCxnSpPr>
+            <a:cxnSpLocks noGrp="1" noRot="1" noChangeAspect="1" noMove="1" noResize="1" noEditPoints="1" noAdjustHandles="1" noChangeArrowheads="1" noChangeShapeType="1"/>
+          </p:cNvCxnSpPr>
+          <p:nvPr>
+            <p:extLst>
+              <p:ext uri="{386F3935-93C4-4BCD-93E2-E3B085C9AB24}">
+                <p16:designElem xmlns:p16="http://schemas.microsoft.com/office/powerpoint/2015/main" val="1"/>
+              </p:ext>
+            </p:extLst>
+          </p:nvPr>
+        </p:nvCxnSpPr>
+        <p:spPr>
+          <a:xfrm flipV="1">
+            <a:off x="0" y="6267922"/>
+            <a:ext cx="4416552" cy="1"/>
+          </a:xfrm>
+          <a:prstGeom prst="line">
+            <a:avLst/>
+          </a:prstGeom>
+          <a:ln w="76200"/>
+        </p:spPr>
+        <p:style>
+          <a:lnRef idx="1">
+            <a:schemeClr val="accent1"/>
+          </a:lnRef>
+          <a:fillRef idx="0">
+            <a:schemeClr val="accent1"/>
+          </a:fillRef>
+          <a:effectRef idx="0">
+            <a:schemeClr val="accent1"/>
+          </a:effectRef>
+          <a:fontRef idx="minor">
+            <a:schemeClr val="tx1"/>
+          </a:fontRef>
+        </p:style>
+      </p:cxnSp>
+      <p:sp>
+        <p:nvSpPr>
+          <p:cNvPr id="4" name="Content Placeholder 3">
+            <a:extLst>
+              <a:ext uri="{FF2B5EF4-FFF2-40B4-BE49-F238E27FC236}">
+                <a16:creationId xmlns:a16="http://schemas.microsoft.com/office/drawing/2014/main" id="{4117039B-F650-1E14-349D-29289DA22E2B}"/>
+              </a:ext>
+            </a:extLst>
+          </p:cNvPr>
+          <p:cNvSpPr>
+            <a:spLocks noGrp="1"/>
+          </p:cNvSpPr>
+          <p:nvPr>
+            <p:ph sz="half" idx="2"/>
+            <p:extLst>
+              <p:ext uri="{E7BDC344-281C-4309-B0C6-D0EE65EED2A8}">
+                <p202:designPr xmlns:p202="http://schemas.microsoft.com/office/powerpoint/2020/02/main">
+                  <p202:designTagLst>
+                    <p202:designTag name="ARCH:1:CLS" val="InformationBlock"/>
+                    <p202:designTag name="ARCH:1:VSVAR" val="TitledTextBox"/>
+                  </p202:designTagLst>
+                </p202:designPr>
+              </p:ext>
+            </p:extLst>
+          </p:nvPr>
+        </p:nvSpPr>
+        <p:spPr>
+          <a:xfrm>
+            <a:off x="5029200" y="2176036"/>
+            <a:ext cx="6501810" cy="4121885"/>
+          </a:xfrm>
+        </p:spPr>
+        <p:txBody>
+          <a:bodyPr>
+            <a:normAutofit/>
+          </a:bodyPr>
+          <a:lstStyle/>
+          <a:p>
+            <a:pPr marL="0" indent="0">
+              <a:spcBef>
+                <a:spcPts val="2500"/>
+              </a:spcBef>
+              <a:buFont typeface="Arial" panose="020B0604020202020204" pitchFamily="34" charset="0"/>
+              <a:buNone/>
+            </a:pPr>
+            <a:r>
+              <a:rPr lang="en-GB" sz="1400" b="1"/>
+              <a:t>Cloud Platform Deployment</a:t>
+            </a:r>
+          </a:p>
+          <a:p>
+            <a:pPr marL="0" lvl="1" indent="0">
+              <a:buFont typeface="Arial" panose="020B0604020202020204" pitchFamily="34" charset="0"/>
+              <a:buNone/>
+            </a:pPr>
+            <a:r>
+              <a:rPr lang="en-GB" sz="1400"/>
+              <a:t>The API is hosted on cloud platforms that provide scalable infrastructure for Java application deployment.</a:t>
+            </a:r>
+          </a:p>
+          <a:p>
+            <a:pPr marL="0" indent="0">
+              <a:spcBef>
+                <a:spcPts val="2500"/>
+              </a:spcBef>
+              <a:buFont typeface="Arial" panose="020B0604020202020204" pitchFamily="34" charset="0"/>
+              <a:buNone/>
+            </a:pPr>
+            <a:r>
+              <a:rPr lang="en-GB" sz="1400" b="1"/>
+              <a:t>Containerization Technology</a:t>
+            </a:r>
+          </a:p>
+          <a:p>
+            <a:pPr marL="0" lvl="1" indent="0">
+              <a:buFont typeface="Arial" panose="020B0604020202020204" pitchFamily="34" charset="0"/>
+              <a:buNone/>
+            </a:pPr>
+            <a:r>
+              <a:rPr lang="en-GB" sz="1400"/>
+              <a:t>Containerization enables consistent environments and easy application packaging for deployment and scaling.</a:t>
+            </a:r>
+          </a:p>
+          <a:p>
+            <a:pPr marL="0" indent="0">
+              <a:spcBef>
+                <a:spcPts val="2500"/>
+              </a:spcBef>
+              <a:buFont typeface="Arial" panose="020B0604020202020204" pitchFamily="34" charset="0"/>
+              <a:buNone/>
+            </a:pPr>
+            <a:r>
+              <a:rPr lang="en-GB" sz="1400" b="1"/>
+              <a:t>Continuous Integration Pipelines</a:t>
+            </a:r>
+          </a:p>
+          <a:p>
+            <a:pPr marL="0" lvl="1" indent="0">
+              <a:buFont typeface="Arial" panose="020B0604020202020204" pitchFamily="34" charset="0"/>
+              <a:buNone/>
+            </a:pPr>
+            <a:r>
+              <a:rPr lang="en-GB" sz="1400"/>
+              <a:t>Continuous integration pipelines automate testing and deployment, ensuring smooth delivery and updates.</a:t>
+            </a:r>
+          </a:p>
+        </p:txBody>
+      </p:sp>
+    </p:spTree>
+    <p:extLst>
+      <p:ext uri="{BB962C8B-B14F-4D97-AF65-F5344CB8AC3E}">
+        <p14:creationId xmlns:p14="http://schemas.microsoft.com/office/powerpoint/2010/main" val="27872024"/>
+      </p:ext>
+    </p:extLst>
+  </p:cSld>
+  <p:clrMapOvr>
+    <a:masterClrMapping/>
+  </p:clrMapOvr>
+  <p:transition>
+    <p:fade/>
+  </p:transition>
+  <p:timing>
+    <p:tnLst>
+      <p:par>
+        <p:cTn id="1" dur="indefinite" restart="never" nodeType="tmRoot">
+          <p:childTnLst>
+            <p:seq concurrent="1" nextAc="seek">
+              <p:cTn id="2" dur="indefinite" nodeType="mainSeq">
+                <p:childTnLst>
+                  <p:par>
+                    <p:cTn id="3" fill="hold">
+                      <p:stCondLst>
+                        <p:cond delay="indefinite"/>
+                        <p:cond evt="onBegin" delay="0">
+                          <p:tn val="2"/>
+                        </p:cond>
+                      </p:stCondLst>
+                      <p:childTnLst>
+                        <p:par>
+                          <p:cTn id="4" fill="hold">
+                            <p:stCondLst>
+                              <p:cond delay="0"/>
+                            </p:stCondLst>
+                            <p:childTnLst>
+                              <p:par>
+                                <p:cTn id="5" presetID="10" presetClass="entr" presetSubtype="0" fill="hold" grpId="0" nodeType="withEffect">
+                                  <p:stCondLst>
+                                    <p:cond delay="250"/>
+                                  </p:stCondLst>
+                                  <p:iterate>
+                                    <p:tmPct val="10000"/>
+                                  </p:iterate>
+                                  <p:childTnLst>
+                                    <p:set>
+                                      <p:cBhvr>
+                                        <p:cTn id="6" dur="1" fill="hold">
+                                          <p:stCondLst>
+                                            <p:cond delay="0"/>
+                                          </p:stCondLst>
+                                        </p:cTn>
+                                        <p:tgtEl>
+                                          <p:spTgt spid="4"/>
+                                        </p:tgtEl>
+                                        <p:attrNameLst>
+                                          <p:attrName>style.visibility</p:attrName>
+                                        </p:attrNameLst>
+                                      </p:cBhvr>
+                                      <p:to>
+                                        <p:strVal val="visible"/>
+                                      </p:to>
+                                    </p:set>
+                                    <p:animEffect transition="in" filter="fade">
+                                      <p:cBhvr>
+                                        <p:cTn id="7" dur="500"/>
+                                        <p:tgtEl>
+                                          <p:spTgt spid="4"/>
+                                        </p:tgtEl>
+                                      </p:cBhvr>
+                                    </p:animEffect>
+                                  </p:childTnLst>
+                                </p:cTn>
+                              </p:par>
+                            </p:childTnLst>
+                          </p:cTn>
+                        </p:par>
+                      </p:childTnLst>
+                    </p:cTn>
+                  </p:par>
+                </p:childTnLst>
+              </p:cTn>
+              <p:prevCondLst>
+                <p:cond evt="onPrev" delay="0">
+                  <p:tgtEl>
+                    <p:sldTgt/>
+                  </p:tgtEl>
+                </p:cond>
+              </p:prevCondLst>
+              <p:nextCondLst>
+                <p:cond evt="onNext" delay="0">
+                  <p:tgtEl>
+                    <p:sldTgt/>
+                  </p:tgtEl>
+                </p:cond>
+              </p:nextCondLst>
+            </p:seq>
+          </p:childTnLst>
+        </p:cTn>
+      </p:par>
+    </p:tnLst>
+    <p:bldLst>
+      <p:bldP spid="4" grpId="0"/>
+    </p:bldLst>
+  </p:timing>
+</p:sld>
+</file>
+
+<file path=ppt/slides/slide19.xml><?xml version="1.0" encoding="utf-8"?>
+<p:sld xmlns:a="http://schemas.openxmlformats.org/drawingml/2006/main" xmlns:r="http://schemas.openxmlformats.org/officeDocument/2006/relationships" xmlns:p="http://schemas.openxmlformats.org/presentationml/2006/main">
+  <p:cSld>
+    <p:bg>
+      <p:bgPr>
+        <a:solidFill>
+          <a:schemeClr val="bg1"/>
+        </a:solidFill>
+        <a:effectLst/>
+      </p:bgPr>
+    </p:bg>
+    <p:spTree>
+      <p:nvGrpSpPr>
+        <p:cNvPr id="1" name=""/>
+        <p:cNvGrpSpPr/>
+        <p:nvPr/>
+      </p:nvGrpSpPr>
+      <p:grpSpPr>
+        <a:xfrm>
+          <a:off x="0" y="0"/>
+          <a:ext cx="0" cy="0"/>
+          <a:chOff x="0" y="0"/>
+          <a:chExt cx="0" cy="0"/>
+        </a:xfrm>
+      </p:grpSpPr>
+      <p:cxnSp>
+        <p:nvCxnSpPr>
+          <p:cNvPr id="10" name="Straight Connector 9">
+            <a:extLst>
+              <a:ext uri="{FF2B5EF4-FFF2-40B4-BE49-F238E27FC236}">
+                <a16:creationId xmlns:a16="http://schemas.microsoft.com/office/drawing/2014/main" id="{118E06E4-607B-144B-382B-AD3D06B1EE8C}"/>
+              </a:ext>
+              <a:ext uri="{C183D7F6-B498-43B3-948B-1728B52AA6E4}">
+                <adec:decorative xmlns:adec="http://schemas.microsoft.com/office/drawing/2017/decorative" val="1"/>
+              </a:ext>
+            </a:extLst>
+          </p:cNvPr>
+          <p:cNvCxnSpPr>
+            <a:cxnSpLocks noGrp="1" noRot="1" noChangeAspect="1" noMove="1" noResize="1" noEditPoints="1" noAdjustHandles="1" noChangeArrowheads="1" noChangeShapeType="1"/>
+          </p:cNvCxnSpPr>
+          <p:nvPr>
+            <p:extLst>
+              <p:ext uri="{386F3935-93C4-4BCD-93E2-E3B085C9AB24}">
+                <p16:designElem xmlns:p16="http://schemas.microsoft.com/office/powerpoint/2015/main" val="1"/>
+              </p:ext>
+            </p:extLst>
+          </p:nvPr>
+        </p:nvCxnSpPr>
+        <p:spPr>
+          <a:xfrm>
+            <a:off x="713232" y="1031001"/>
+            <a:ext cx="978862" cy="0"/>
+          </a:xfrm>
+          <a:prstGeom prst="line">
+            <a:avLst/>
+          </a:prstGeom>
+          <a:ln w="76200"/>
+        </p:spPr>
+        <p:style>
+          <a:lnRef idx="1">
+            <a:schemeClr val="accent1"/>
+          </a:lnRef>
+          <a:fillRef idx="0">
+            <a:schemeClr val="accent1"/>
+          </a:fillRef>
+          <a:effectRef idx="0">
+            <a:schemeClr val="accent1"/>
+          </a:effectRef>
+          <a:fontRef idx="minor">
+            <a:schemeClr val="tx1"/>
+          </a:fontRef>
+        </p:style>
+      </p:cxnSp>
+      <p:sp useBgFill="1">
+        <p:nvSpPr>
+          <p:cNvPr id="12" name="Rectangle 11">
+            <a:extLst>
+              <a:ext uri="{FF2B5EF4-FFF2-40B4-BE49-F238E27FC236}">
+                <a16:creationId xmlns:a16="http://schemas.microsoft.com/office/drawing/2014/main" id="{744CAA32-F237-419C-A2DD-43C28D920D3C}"/>
+              </a:ext>
+              <a:ext uri="{C183D7F6-B498-43B3-948B-1728B52AA6E4}">
+                <adec:decorative xmlns:adec="http://schemas.microsoft.com/office/drawing/2017/decorative" val="1"/>
+              </a:ext>
+            </a:extLst>
+          </p:cNvPr>
+          <p:cNvSpPr>
+            <a:spLocks noGrp="1" noRot="1" noChangeAspect="1" noMove="1" noResize="1" noEditPoints="1" noAdjustHandles="1" noChangeArrowheads="1" noChangeShapeType="1" noTextEdit="1"/>
+          </p:cNvSpPr>
+          <p:nvPr>
+            <p:extLst>
+              <p:ext uri="{386F3935-93C4-4BCD-93E2-E3B085C9AB24}">
+                <p16:designElem xmlns:p16="http://schemas.microsoft.com/office/powerpoint/2015/main" val="1"/>
+              </p:ext>
+            </p:extLst>
+          </p:nvPr>
+        </p:nvSpPr>
+        <p:spPr>
+          <a:xfrm>
+            <a:off x="0" y="0"/>
+            <a:ext cx="12192000" cy="6858000"/>
+          </a:xfrm>
+          <a:prstGeom prst="rect">
+            <a:avLst/>
+          </a:prstGeom>
+          <a:ln w="12700" cap="flat" cmpd="sng" algn="ctr">
+            <a:noFill/>
+            <a:prstDash val="solid"/>
+            <a:miter lim="800000"/>
+          </a:ln>
+          <a:effectLst/>
+          <a:extLst>
+            <a:ext uri="{91240B29-F687-4F45-9708-019B960494DF}">
+              <a14:hiddenLine xmlns:a14="http://schemas.microsoft.com/office/drawing/2010/main" w="12700" cap="flat" cmpd="sng" algn="ctr">
+                <a:solidFill>
+                  <a:schemeClr val="accent1">
+                    <a:shade val="50000"/>
+                  </a:schemeClr>
+                </a:solidFill>
+                <a:prstDash val="solid"/>
+                <a:miter lim="800000"/>
+              </a14:hiddenLine>
+            </a:ext>
+          </a:extLst>
+        </p:spPr>
+        <p:style>
+          <a:lnRef idx="2">
+            <a:schemeClr val="accent1">
+              <a:shade val="50000"/>
+            </a:schemeClr>
+          </a:lnRef>
+          <a:fillRef idx="1">
+            <a:schemeClr val="accent1"/>
+          </a:fillRef>
+          <a:effectRef idx="0">
+            <a:schemeClr val="accent1"/>
+          </a:effectRef>
+          <a:fontRef idx="minor">
+            <a:schemeClr val="lt1"/>
+          </a:fontRef>
+        </p:style>
+        <p:txBody>
+          <a:bodyPr rtlCol="0" anchor="ctr"/>
+          <a:lstStyle/>
+          <a:p>
+            <a:pPr algn="ctr"/>
+            <a:endParaRPr lang="en-US"/>
+          </a:p>
+        </p:txBody>
+      </p:sp>
+      <p:sp>
+        <p:nvSpPr>
+          <p:cNvPr id="2" name="Title 1">
+            <a:extLst>
+              <a:ext uri="{FF2B5EF4-FFF2-40B4-BE49-F238E27FC236}">
                 <a16:creationId xmlns:a16="http://schemas.microsoft.com/office/drawing/2014/main" id="{6C614782-0306-346F-2012-84563A1C1420}"/>
               </a:ext>
             </a:extLst>
@@ -13164,194 +13358,6 @@
 </p:sld>
 </file>
 
-<file path=ppt/slides/slide19.xml><?xml version="1.0" encoding="utf-8"?>
-<p:sld xmlns:a="http://schemas.openxmlformats.org/drawingml/2006/main" xmlns:r="http://schemas.openxmlformats.org/officeDocument/2006/relationships" xmlns:p="http://schemas.openxmlformats.org/presentationml/2006/main">
-  <p:cSld>
-    <p:spTree>
-      <p:nvGrpSpPr>
-        <p:cNvPr id="1" name=""/>
-        <p:cNvGrpSpPr/>
-        <p:nvPr/>
-      </p:nvGrpSpPr>
-      <p:grpSpPr>
-        <a:xfrm>
-          <a:off x="0" y="0"/>
-          <a:ext cx="0" cy="0"/>
-          <a:chOff x="0" y="0"/>
-          <a:chExt cx="0" cy="0"/>
-        </a:xfrm>
-      </p:grpSpPr>
-      <p:sp>
-        <p:nvSpPr>
-          <p:cNvPr id="2" name="Title 1">
-            <a:extLst>
-              <a:ext uri="{FF2B5EF4-FFF2-40B4-BE49-F238E27FC236}">
-                <a16:creationId xmlns:a16="http://schemas.microsoft.com/office/drawing/2014/main" id="{F1F2CF3A-5A6F-5699-710D-CB76118BFD91}"/>
-              </a:ext>
-            </a:extLst>
-          </p:cNvPr>
-          <p:cNvSpPr>
-            <a:spLocks noGrp="1"/>
-          </p:cNvSpPr>
-          <p:nvPr>
-            <p:ph type="title"/>
-          </p:nvPr>
-        </p:nvSpPr>
-        <p:spPr>
-          <a:xfrm>
-            <a:off x="650535" y="16112"/>
-            <a:ext cx="10890929" cy="691459"/>
-          </a:xfrm>
-        </p:spPr>
-        <p:txBody>
-          <a:bodyPr>
-            <a:normAutofit/>
-          </a:bodyPr>
-          <a:lstStyle/>
-          <a:p>
-            <a:r>
-              <a:rPr lang="en-GB" sz="1800" dirty="0"/>
-              <a:t>Why mock tests?</a:t>
-            </a:r>
-          </a:p>
-        </p:txBody>
-      </p:sp>
-      <p:sp>
-        <p:nvSpPr>
-          <p:cNvPr id="3" name="Content Placeholder 2">
-            <a:extLst>
-              <a:ext uri="{FF2B5EF4-FFF2-40B4-BE49-F238E27FC236}">
-                <a16:creationId xmlns:a16="http://schemas.microsoft.com/office/drawing/2014/main" id="{ED449708-B4E2-D625-64BC-4AA9ECBA966A}"/>
-              </a:ext>
-            </a:extLst>
-          </p:cNvPr>
-          <p:cNvSpPr>
-            <a:spLocks noGrp="1"/>
-          </p:cNvSpPr>
-          <p:nvPr>
-            <p:ph sz="half" idx="1"/>
-          </p:nvPr>
-        </p:nvSpPr>
-        <p:spPr>
-          <a:xfrm>
-            <a:off x="738050" y="492906"/>
-            <a:ext cx="9548949" cy="3554403"/>
-          </a:xfrm>
-        </p:spPr>
-        <p:txBody>
-          <a:bodyPr>
-            <a:noAutofit/>
-          </a:bodyPr>
-          <a:lstStyle/>
-          <a:p>
-            <a:r>
-              <a:rPr lang="en-US" sz="1600" dirty="0"/>
-              <a:t>Mock tests are not strictly necessary, but they are highly recommended for unit testing services like </a:t>
-            </a:r>
-            <a:r>
-              <a:rPr lang="en-US" sz="1600" dirty="0" err="1"/>
-              <a:t>UserService</a:t>
-            </a:r>
-            <a:r>
-              <a:rPr lang="en-US" sz="1600" dirty="0"/>
-              <a:t>.</a:t>
-            </a:r>
-          </a:p>
-          <a:p>
-            <a:r>
-              <a:rPr lang="en-US" sz="1600" dirty="0"/>
-              <a:t>You could write simple tests without mocks, but:</a:t>
-            </a:r>
-          </a:p>
-          <a:p>
-            <a:r>
-              <a:rPr lang="en-US" sz="1600" dirty="0"/>
-              <a:t>You would need a real database or in-memory database, and real dependencies.</a:t>
-            </a:r>
-          </a:p>
-          <a:p>
-            <a:r>
-              <a:rPr lang="en-US" sz="1600" dirty="0"/>
-              <a:t>Your tests would be slower, harder to set up, and could fail for reasons unrelated to your service logic (like database issues).</a:t>
-            </a:r>
-          </a:p>
-          <a:p>
-            <a:r>
-              <a:rPr lang="en-US" sz="1600" dirty="0"/>
-              <a:t>Mocks let you:</a:t>
-            </a:r>
-          </a:p>
-          <a:p>
-            <a:r>
-              <a:rPr lang="en-US" sz="1600" dirty="0"/>
-              <a:t>Test only your service logic, not the database or external systems.</a:t>
-            </a:r>
-          </a:p>
-          <a:p>
-            <a:r>
-              <a:rPr lang="en-US" sz="1600" dirty="0"/>
-              <a:t>Make tests fast, reliable, and easy to control.</a:t>
-            </a:r>
-          </a:p>
-          <a:p>
-            <a:r>
-              <a:rPr lang="en-US" sz="1600" dirty="0"/>
-              <a:t>Simulate different scenarios (user exists, user does not exist, etc.) easily.</a:t>
-            </a:r>
-          </a:p>
-          <a:p>
-            <a:r>
-              <a:rPr lang="en-US" sz="1600" dirty="0"/>
-              <a:t>In summary:</a:t>
-            </a:r>
-          </a:p>
-          <a:p>
-            <a:r>
-              <a:rPr lang="en-US" sz="1600" dirty="0"/>
-              <a:t>For true unit tests of service classes, mocking is best practice.</a:t>
-            </a:r>
-          </a:p>
-          <a:p>
-            <a:r>
-              <a:rPr lang="en-US" sz="1600" dirty="0"/>
-              <a:t>For integration tests (testing everything together), you can use real dependencies, but those are a different kind of test.</a:t>
-            </a:r>
-          </a:p>
-          <a:p>
-            <a:r>
-              <a:rPr lang="en-US" sz="1600" dirty="0"/>
-              <a:t>For your </a:t>
-            </a:r>
-            <a:r>
-              <a:rPr lang="en-US" sz="1600" dirty="0" err="1"/>
-              <a:t>UserService</a:t>
-            </a:r>
-            <a:r>
-              <a:rPr lang="en-US" sz="1600" dirty="0"/>
-              <a:t>, using mocks is the standard and most effective approach.</a:t>
-            </a:r>
-          </a:p>
-          <a:p>
-            <a:br>
-              <a:rPr lang="en-US" sz="1600" dirty="0"/>
-            </a:br>
-            <a:endParaRPr lang="en-GB" sz="1600" dirty="0"/>
-          </a:p>
-        </p:txBody>
-      </p:sp>
-    </p:spTree>
-    <p:extLst>
-      <p:ext uri="{BB962C8B-B14F-4D97-AF65-F5344CB8AC3E}">
-        <p14:creationId xmlns:p14="http://schemas.microsoft.com/office/powerpoint/2010/main" val="150403729"/>
-      </p:ext>
-    </p:extLst>
-  </p:cSld>
-  <p:clrMapOvr>
-    <a:masterClrMapping/>
-  </p:clrMapOvr>
-</p:sld>
-</file>
-
 <file path=ppt/slides/slide2.xml><?xml version="1.0" encoding="utf-8"?>
 <p:sld xmlns:a="http://schemas.openxmlformats.org/drawingml/2006/main" xmlns:r="http://schemas.openxmlformats.org/officeDocument/2006/relationships" xmlns:p="http://schemas.openxmlformats.org/presentationml/2006/main">
   <p:cSld>
@@ -13788,6 +13794,194 @@
 </file>
 
 <file path=ppt/slides/slide20.xml><?xml version="1.0" encoding="utf-8"?>
+<p:sld xmlns:a="http://schemas.openxmlformats.org/drawingml/2006/main" xmlns:r="http://schemas.openxmlformats.org/officeDocument/2006/relationships" xmlns:p="http://schemas.openxmlformats.org/presentationml/2006/main">
+  <p:cSld>
+    <p:spTree>
+      <p:nvGrpSpPr>
+        <p:cNvPr id="1" name=""/>
+        <p:cNvGrpSpPr/>
+        <p:nvPr/>
+      </p:nvGrpSpPr>
+      <p:grpSpPr>
+        <a:xfrm>
+          <a:off x="0" y="0"/>
+          <a:ext cx="0" cy="0"/>
+          <a:chOff x="0" y="0"/>
+          <a:chExt cx="0" cy="0"/>
+        </a:xfrm>
+      </p:grpSpPr>
+      <p:sp>
+        <p:nvSpPr>
+          <p:cNvPr id="2" name="Title 1">
+            <a:extLst>
+              <a:ext uri="{FF2B5EF4-FFF2-40B4-BE49-F238E27FC236}">
+                <a16:creationId xmlns:a16="http://schemas.microsoft.com/office/drawing/2014/main" id="{F1F2CF3A-5A6F-5699-710D-CB76118BFD91}"/>
+              </a:ext>
+            </a:extLst>
+          </p:cNvPr>
+          <p:cNvSpPr>
+            <a:spLocks noGrp="1"/>
+          </p:cNvSpPr>
+          <p:nvPr>
+            <p:ph type="title"/>
+          </p:nvPr>
+        </p:nvSpPr>
+        <p:spPr>
+          <a:xfrm>
+            <a:off x="650535" y="16112"/>
+            <a:ext cx="10890929" cy="691459"/>
+          </a:xfrm>
+        </p:spPr>
+        <p:txBody>
+          <a:bodyPr>
+            <a:normAutofit/>
+          </a:bodyPr>
+          <a:lstStyle/>
+          <a:p>
+            <a:r>
+              <a:rPr lang="en-GB" sz="1800" dirty="0"/>
+              <a:t>Why mock tests?</a:t>
+            </a:r>
+          </a:p>
+        </p:txBody>
+      </p:sp>
+      <p:sp>
+        <p:nvSpPr>
+          <p:cNvPr id="3" name="Content Placeholder 2">
+            <a:extLst>
+              <a:ext uri="{FF2B5EF4-FFF2-40B4-BE49-F238E27FC236}">
+                <a16:creationId xmlns:a16="http://schemas.microsoft.com/office/drawing/2014/main" id="{ED449708-B4E2-D625-64BC-4AA9ECBA966A}"/>
+              </a:ext>
+            </a:extLst>
+          </p:cNvPr>
+          <p:cNvSpPr>
+            <a:spLocks noGrp="1"/>
+          </p:cNvSpPr>
+          <p:nvPr>
+            <p:ph sz="half" idx="1"/>
+          </p:nvPr>
+        </p:nvSpPr>
+        <p:spPr>
+          <a:xfrm>
+            <a:off x="738050" y="492906"/>
+            <a:ext cx="9548949" cy="3554403"/>
+          </a:xfrm>
+        </p:spPr>
+        <p:txBody>
+          <a:bodyPr>
+            <a:noAutofit/>
+          </a:bodyPr>
+          <a:lstStyle/>
+          <a:p>
+            <a:r>
+              <a:rPr lang="en-US" sz="1600" dirty="0"/>
+              <a:t>Mock tests are not strictly necessary, but they are highly recommended for unit testing services like </a:t>
+            </a:r>
+            <a:r>
+              <a:rPr lang="en-US" sz="1600" dirty="0" err="1"/>
+              <a:t>UserService</a:t>
+            </a:r>
+            <a:r>
+              <a:rPr lang="en-US" sz="1600" dirty="0"/>
+              <a:t>.</a:t>
+            </a:r>
+          </a:p>
+          <a:p>
+            <a:r>
+              <a:rPr lang="en-US" sz="1600" dirty="0"/>
+              <a:t>You could write simple tests without mocks, but:</a:t>
+            </a:r>
+          </a:p>
+          <a:p>
+            <a:r>
+              <a:rPr lang="en-US" sz="1600" dirty="0"/>
+              <a:t>You would need a real database or in-memory database, and real dependencies.</a:t>
+            </a:r>
+          </a:p>
+          <a:p>
+            <a:r>
+              <a:rPr lang="en-US" sz="1600" dirty="0"/>
+              <a:t>Your tests would be slower, harder to set up, and could fail for reasons unrelated to your service logic (like database issues).</a:t>
+            </a:r>
+          </a:p>
+          <a:p>
+            <a:r>
+              <a:rPr lang="en-US" sz="1600" dirty="0"/>
+              <a:t>Mocks let you:</a:t>
+            </a:r>
+          </a:p>
+          <a:p>
+            <a:r>
+              <a:rPr lang="en-US" sz="1600" dirty="0"/>
+              <a:t>Test only your service logic, not the database or external systems.</a:t>
+            </a:r>
+          </a:p>
+          <a:p>
+            <a:r>
+              <a:rPr lang="en-US" sz="1600" dirty="0"/>
+              <a:t>Make tests fast, reliable, and easy to control.</a:t>
+            </a:r>
+          </a:p>
+          <a:p>
+            <a:r>
+              <a:rPr lang="en-US" sz="1600" dirty="0"/>
+              <a:t>Simulate different scenarios (user exists, user does not exist, etc.) easily.</a:t>
+            </a:r>
+          </a:p>
+          <a:p>
+            <a:r>
+              <a:rPr lang="en-US" sz="1600" dirty="0"/>
+              <a:t>In summary:</a:t>
+            </a:r>
+          </a:p>
+          <a:p>
+            <a:r>
+              <a:rPr lang="en-US" sz="1600" dirty="0"/>
+              <a:t>For true unit tests of service classes, mocking is best practice.</a:t>
+            </a:r>
+          </a:p>
+          <a:p>
+            <a:r>
+              <a:rPr lang="en-US" sz="1600" dirty="0"/>
+              <a:t>For integration tests (testing everything together), you can use real dependencies, but those are a different kind of test.</a:t>
+            </a:r>
+          </a:p>
+          <a:p>
+            <a:r>
+              <a:rPr lang="en-US" sz="1600" dirty="0"/>
+              <a:t>For your </a:t>
+            </a:r>
+            <a:r>
+              <a:rPr lang="en-US" sz="1600" dirty="0" err="1"/>
+              <a:t>UserService</a:t>
+            </a:r>
+            <a:r>
+              <a:rPr lang="en-US" sz="1600" dirty="0"/>
+              <a:t>, using mocks is the standard and most effective approach.</a:t>
+            </a:r>
+          </a:p>
+          <a:p>
+            <a:br>
+              <a:rPr lang="en-US" sz="1600" dirty="0"/>
+            </a:br>
+            <a:endParaRPr lang="en-GB" sz="1600" dirty="0"/>
+          </a:p>
+        </p:txBody>
+      </p:sp>
+    </p:spTree>
+    <p:extLst>
+      <p:ext uri="{BB962C8B-B14F-4D97-AF65-F5344CB8AC3E}">
+        <p14:creationId xmlns:p14="http://schemas.microsoft.com/office/powerpoint/2010/main" val="150403729"/>
+      </p:ext>
+    </p:extLst>
+  </p:cSld>
+  <p:clrMapOvr>
+    <a:masterClrMapping/>
+  </p:clrMapOvr>
+</p:sld>
+</file>
+
+<file path=ppt/slides/slide21.xml><?xml version="1.0" encoding="utf-8"?>
 <p:sld xmlns:a="http://schemas.openxmlformats.org/drawingml/2006/main" xmlns:r="http://schemas.openxmlformats.org/officeDocument/2006/relationships" xmlns:p="http://schemas.openxmlformats.org/presentationml/2006/main">
   <p:cSld>
     <p:bg>

</xml_diff>